<commit_message>
revision including python scripts
</commit_message>
<xml_diff>
--- a/Figure1.pptx
+++ b/Figure1.pptx
@@ -1752,7 +1752,7 @@
         <a:lstStyle/>
         <a:p>
           <a:r>
-            <a:rPr lang="en-US" sz="1800" dirty="0">
+            <a:rPr lang="en-US" sz="1800">
               <a:solidFill>
                 <a:schemeClr val="tx1"/>
               </a:solidFill>
@@ -1762,7 +1762,7 @@
         </a:p>
         <a:p>
           <a:r>
-            <a:rPr lang="en-US" sz="1800" dirty="0">
+            <a:rPr lang="en-US" sz="1800">
               <a:solidFill>
                 <a:schemeClr val="tx1"/>
               </a:solidFill>
@@ -1809,7 +1809,7 @@
         <a:lstStyle/>
         <a:p>
           <a:r>
-            <a:rPr lang="en-US" sz="1800" dirty="0">
+            <a:rPr lang="en-US" sz="1800">
               <a:solidFill>
                 <a:schemeClr val="tx1"/>
               </a:solidFill>
@@ -1819,7 +1819,7 @@
         </a:p>
         <a:p>
           <a:r>
-            <a:rPr lang="en-US" sz="1800" dirty="0">
+            <a:rPr lang="en-US" sz="1800">
               <a:solidFill>
                 <a:schemeClr val="tx1"/>
               </a:solidFill>
@@ -1868,7 +1868,7 @@
         <a:lstStyle/>
         <a:p>
           <a:r>
-            <a:rPr lang="en-US" sz="1800" dirty="0">
+            <a:rPr lang="en-US" sz="1800">
               <a:solidFill>
                 <a:schemeClr val="tx1"/>
               </a:solidFill>
@@ -1878,7 +1878,7 @@
         </a:p>
         <a:p>
           <a:r>
-            <a:rPr lang="en-US" sz="1800" dirty="0">
+            <a:rPr lang="en-US" sz="1800">
               <a:solidFill>
                 <a:schemeClr val="tx1"/>
               </a:solidFill>
@@ -1888,7 +1888,7 @@
         </a:p>
         <a:p>
           <a:r>
-            <a:rPr lang="en-US" sz="1800" dirty="0">
+            <a:rPr lang="en-US" sz="1800">
               <a:solidFill>
                 <a:schemeClr val="tx1"/>
               </a:solidFill>
@@ -1937,7 +1937,7 @@
         <a:lstStyle/>
         <a:p>
           <a:r>
-            <a:rPr lang="en-US" sz="1800" dirty="0">
+            <a:rPr lang="en-US" sz="1800">
               <a:solidFill>
                 <a:schemeClr val="tx1"/>
               </a:solidFill>
@@ -1947,7 +1947,7 @@
         </a:p>
         <a:p>
           <a:r>
-            <a:rPr lang="en-US" sz="1800" dirty="0">
+            <a:rPr lang="en-US" sz="1800">
               <a:solidFill>
                 <a:schemeClr val="tx1"/>
               </a:solidFill>
@@ -1996,7 +1996,7 @@
         <a:lstStyle/>
         <a:p>
           <a:r>
-            <a:rPr lang="en-US" sz="1800" dirty="0">
+            <a:rPr lang="en-US" sz="1800">
               <a:solidFill>
                 <a:schemeClr val="tx1"/>
               </a:solidFill>
@@ -2006,7 +2006,7 @@
         </a:p>
         <a:p>
           <a:r>
-            <a:rPr lang="en-US" sz="1800" dirty="0">
+            <a:rPr lang="en-US" sz="1800">
               <a:solidFill>
                 <a:schemeClr val="tx1"/>
               </a:solidFill>
@@ -2055,7 +2055,7 @@
         <a:lstStyle/>
         <a:p>
           <a:r>
-            <a:rPr lang="en-US" sz="1800" dirty="0">
+            <a:rPr lang="en-US" sz="1800">
               <a:solidFill>
                 <a:schemeClr val="tx1"/>
               </a:solidFill>
@@ -2065,7 +2065,7 @@
         </a:p>
         <a:p>
           <a:r>
-            <a:rPr lang="en-US" sz="1800" dirty="0">
+            <a:rPr lang="en-US" sz="1800">
               <a:solidFill>
                 <a:schemeClr val="tx1"/>
               </a:solidFill>
@@ -2120,6 +2120,65 @@
               </a:solidFill>
             </a:rPr>
             <a:t>Scripts Available</a:t>
+          </a:r>
+        </a:p>
+        <a:p>
+          <a:r>
+            <a:rPr lang="en-US" sz="1800" dirty="0">
+              <a:solidFill>
+                <a:schemeClr val="tx1"/>
+              </a:solidFill>
+            </a:rPr>
+            <a:t>N = 37</a:t>
+          </a:r>
+          <a:endParaRPr lang="nl-NL" sz="1800" dirty="0">
+            <a:solidFill>
+              <a:schemeClr val="tx1"/>
+            </a:solidFill>
+          </a:endParaRPr>
+        </a:p>
+      </dgm:t>
+    </dgm:pt>
+    <dgm:pt modelId="{7462DDD1-F283-42DB-AB71-270FC8A6AF1F}" type="parTrans" cxnId="{A1EE6A0D-5353-47FF-9DD5-F03D19076821}">
+      <dgm:prSet/>
+      <dgm:spPr>
+        <a:ln w="28575"/>
+      </dgm:spPr>
+      <dgm:t>
+        <a:bodyPr/>
+        <a:lstStyle/>
+        <a:p>
+          <a:endParaRPr lang="nl-NL"/>
+        </a:p>
+      </dgm:t>
+    </dgm:pt>
+    <dgm:pt modelId="{89FCA33B-7242-4EBA-A6D8-8E97DCFF9048}" type="sibTrans" cxnId="{A1EE6A0D-5353-47FF-9DD5-F03D19076821}">
+      <dgm:prSet/>
+      <dgm:spPr/>
+      <dgm:t>
+        <a:bodyPr/>
+        <a:lstStyle/>
+        <a:p>
+          <a:endParaRPr lang="nl-NL"/>
+        </a:p>
+      </dgm:t>
+    </dgm:pt>
+    <dgm:pt modelId="{A243FECC-01F6-47EF-A427-18D141536F62}">
+      <dgm:prSet custT="1"/>
+      <dgm:spPr>
+        <a:ln w="28575"/>
+      </dgm:spPr>
+      <dgm:t>
+        <a:bodyPr/>
+        <a:lstStyle/>
+        <a:p>
+          <a:r>
+            <a:rPr lang="en-US" sz="1800" dirty="0">
+              <a:solidFill>
+                <a:schemeClr val="tx1"/>
+              </a:solidFill>
+            </a:rPr>
+            <a:t>Data Available</a:t>
           </a:r>
         </a:p>
         <a:p>
@@ -2139,65 +2198,6 @@
         </a:p>
       </dgm:t>
     </dgm:pt>
-    <dgm:pt modelId="{7462DDD1-F283-42DB-AB71-270FC8A6AF1F}" type="parTrans" cxnId="{A1EE6A0D-5353-47FF-9DD5-F03D19076821}">
-      <dgm:prSet/>
-      <dgm:spPr>
-        <a:ln w="28575"/>
-      </dgm:spPr>
-      <dgm:t>
-        <a:bodyPr/>
-        <a:lstStyle/>
-        <a:p>
-          <a:endParaRPr lang="nl-NL"/>
-        </a:p>
-      </dgm:t>
-    </dgm:pt>
-    <dgm:pt modelId="{89FCA33B-7242-4EBA-A6D8-8E97DCFF9048}" type="sibTrans" cxnId="{A1EE6A0D-5353-47FF-9DD5-F03D19076821}">
-      <dgm:prSet/>
-      <dgm:spPr/>
-      <dgm:t>
-        <a:bodyPr/>
-        <a:lstStyle/>
-        <a:p>
-          <a:endParaRPr lang="nl-NL"/>
-        </a:p>
-      </dgm:t>
-    </dgm:pt>
-    <dgm:pt modelId="{A243FECC-01F6-47EF-A427-18D141536F62}">
-      <dgm:prSet custT="1"/>
-      <dgm:spPr>
-        <a:ln w="28575"/>
-      </dgm:spPr>
-      <dgm:t>
-        <a:bodyPr/>
-        <a:lstStyle/>
-        <a:p>
-          <a:r>
-            <a:rPr lang="en-US" sz="1800" dirty="0">
-              <a:solidFill>
-                <a:schemeClr val="tx1"/>
-              </a:solidFill>
-            </a:rPr>
-            <a:t>Data Available</a:t>
-          </a:r>
-        </a:p>
-        <a:p>
-          <a:r>
-            <a:rPr lang="en-US" sz="1800" dirty="0">
-              <a:solidFill>
-                <a:schemeClr val="tx1"/>
-              </a:solidFill>
-            </a:rPr>
-            <a:t>N = 43</a:t>
-          </a:r>
-          <a:endParaRPr lang="nl-NL" sz="1800" dirty="0">
-            <a:solidFill>
-              <a:schemeClr val="tx1"/>
-            </a:solidFill>
-          </a:endParaRPr>
-        </a:p>
-      </dgm:t>
-    </dgm:pt>
     <dgm:pt modelId="{E7F01257-8479-40BF-8579-A2A2FF300C3A}" type="parTrans" cxnId="{26EB9554-EFD1-492C-AE38-D158D8BB363F}">
       <dgm:prSet/>
       <dgm:spPr>
@@ -2222,7 +2222,7 @@
         </a:p>
       </dgm:t>
     </dgm:pt>
-    <dgm:pt modelId="{B783E18C-2602-48BA-A831-683DB3893F2F}">
+    <dgm:pt modelId="{FA4799A0-A1A0-4F59-AD7B-E0EB6B8FFADF}">
       <dgm:prSet custT="1"/>
       <dgm:spPr>
         <a:ln w="28575"/>
@@ -2237,7 +2237,7 @@
                 <a:schemeClr val="tx1"/>
               </a:solidFill>
             </a:rPr>
-            <a:t>Other Languages</a:t>
+            <a:t>Data and Code Available </a:t>
           </a:r>
         </a:p>
         <a:p>
@@ -2247,7 +2247,7 @@
                 <a:schemeClr val="tx1"/>
               </a:solidFill>
             </a:rPr>
-            <a:t>N = 5</a:t>
+            <a:t>N = 35</a:t>
           </a:r>
           <a:endParaRPr lang="nl-NL" sz="1800" dirty="0">
             <a:solidFill>
@@ -2257,7 +2257,7 @@
         </a:p>
       </dgm:t>
     </dgm:pt>
-    <dgm:pt modelId="{B3CB0421-242B-4A01-8C14-F8DCD3C16DD1}" type="parTrans" cxnId="{EF38E2FA-A22F-440B-97B9-3196FE5DCA20}">
+    <dgm:pt modelId="{16748D59-4592-47AE-975A-131BE08B71F4}" type="parTrans" cxnId="{1CD3B177-EFAD-4237-8CE6-FB53693D711D}">
       <dgm:prSet/>
       <dgm:spPr>
         <a:ln w="28575"/>
@@ -2270,7 +2270,7 @@
         </a:p>
       </dgm:t>
     </dgm:pt>
-    <dgm:pt modelId="{47A25A4B-FDCF-424A-B15D-FAB993BFDCF9}" type="sibTrans" cxnId="{EF38E2FA-A22F-440B-97B9-3196FE5DCA20}">
+    <dgm:pt modelId="{2135DDFE-B1F9-4663-BADC-AD7DC105ACCF}" type="sibTrans" cxnId="{1CD3B177-EFAD-4237-8CE6-FB53693D711D}">
       <dgm:prSet/>
       <dgm:spPr/>
       <dgm:t>
@@ -2281,7 +2281,125 @@
         </a:p>
       </dgm:t>
     </dgm:pt>
-    <dgm:pt modelId="{0BC1B8F2-4F37-45C9-803C-8D0D7FF5FB7C}">
+    <dgm:pt modelId="{607FCB25-8266-4E8C-BB25-F6190E2C5A51}">
+      <dgm:prSet custT="1"/>
+      <dgm:spPr>
+        <a:ln w="28575"/>
+      </dgm:spPr>
+      <dgm:t>
+        <a:bodyPr/>
+        <a:lstStyle/>
+        <a:p>
+          <a:r>
+            <a:rPr lang="en-US" sz="1800" dirty="0">
+              <a:solidFill>
+                <a:schemeClr val="tx1"/>
+              </a:solidFill>
+            </a:rPr>
+            <a:t>Run Scripts</a:t>
+          </a:r>
+        </a:p>
+        <a:p>
+          <a:r>
+            <a:rPr lang="en-US" sz="1800" dirty="0">
+              <a:solidFill>
+                <a:schemeClr val="tx1"/>
+              </a:solidFill>
+            </a:rPr>
+            <a:t>N = 31</a:t>
+          </a:r>
+          <a:endParaRPr lang="nl-NL" sz="1800" dirty="0">
+            <a:solidFill>
+              <a:schemeClr val="tx1"/>
+            </a:solidFill>
+          </a:endParaRPr>
+        </a:p>
+      </dgm:t>
+    </dgm:pt>
+    <dgm:pt modelId="{B36DDFBD-93BC-4CD6-A52A-FC243FDC3227}" type="parTrans" cxnId="{1F88F132-FDC8-4FD4-B1AC-544E3716542B}">
+      <dgm:prSet/>
+      <dgm:spPr>
+        <a:ln w="28575"/>
+      </dgm:spPr>
+      <dgm:t>
+        <a:bodyPr/>
+        <a:lstStyle/>
+        <a:p>
+          <a:endParaRPr lang="nl-NL"/>
+        </a:p>
+      </dgm:t>
+    </dgm:pt>
+    <dgm:pt modelId="{F21C7168-A9F3-46E9-B8D7-54CC1203A00C}" type="sibTrans" cxnId="{1F88F132-FDC8-4FD4-B1AC-544E3716542B}">
+      <dgm:prSet/>
+      <dgm:spPr/>
+      <dgm:t>
+        <a:bodyPr/>
+        <a:lstStyle/>
+        <a:p>
+          <a:endParaRPr lang="nl-NL"/>
+        </a:p>
+      </dgm:t>
+    </dgm:pt>
+    <dgm:pt modelId="{9EBA7DD3-EFD4-4FB0-9D1D-F3CF4D51BB04}">
+      <dgm:prSet/>
+      <dgm:spPr>
+        <a:ln w="28575"/>
+      </dgm:spPr>
+      <dgm:t>
+        <a:bodyPr/>
+        <a:lstStyle/>
+        <a:p>
+          <a:r>
+            <a:rPr lang="en-US" dirty="0">
+              <a:solidFill>
+                <a:schemeClr val="tx1"/>
+              </a:solidFill>
+            </a:rPr>
+            <a:t>Reproducible</a:t>
+          </a:r>
+        </a:p>
+        <a:p>
+          <a:r>
+            <a:rPr lang="en-US" dirty="0">
+              <a:solidFill>
+                <a:schemeClr val="tx1"/>
+              </a:solidFill>
+            </a:rPr>
+            <a:t>N = 20</a:t>
+          </a:r>
+          <a:endParaRPr lang="nl-NL" dirty="0">
+            <a:solidFill>
+              <a:schemeClr val="tx1"/>
+            </a:solidFill>
+          </a:endParaRPr>
+        </a:p>
+      </dgm:t>
+    </dgm:pt>
+    <dgm:pt modelId="{7938C59D-E1DC-4C0F-871A-2C0CDC2677B9}" type="parTrans" cxnId="{0D05B572-5FD3-4E5A-9E27-1982552CA181}">
+      <dgm:prSet/>
+      <dgm:spPr>
+        <a:ln w="28575"/>
+      </dgm:spPr>
+      <dgm:t>
+        <a:bodyPr/>
+        <a:lstStyle/>
+        <a:p>
+          <a:endParaRPr lang="nl-NL"/>
+        </a:p>
+      </dgm:t>
+    </dgm:pt>
+    <dgm:pt modelId="{8AB2491D-65A1-4C50-8EF2-932E7B012D94}" type="sibTrans" cxnId="{0D05B572-5FD3-4E5A-9E27-1982552CA181}">
+      <dgm:prSet/>
+      <dgm:spPr/>
+      <dgm:t>
+        <a:bodyPr/>
+        <a:lstStyle/>
+        <a:p>
+          <a:endParaRPr lang="nl-NL"/>
+        </a:p>
+      </dgm:t>
+    </dgm:pt>
+    <dgm:pt modelId="{E2D7F6EE-B8EA-4AC5-9F23-A58A00294E2D}">
       <dgm:prSet custT="1"/>
       <dgm:spPr>
         <a:ln w="28575"/>
@@ -2316,7 +2434,7 @@
         </a:p>
       </dgm:t>
     </dgm:pt>
-    <dgm:pt modelId="{9343353A-BBEE-4C98-B9B8-5461F652185E}" type="parTrans" cxnId="{727243D4-B079-419F-A83F-A9994986C37E}">
+    <dgm:pt modelId="{2877F2C1-5503-4641-AB48-7F67E569974D}" type="parTrans" cxnId="{390BFC48-DE66-4C05-9BC8-C4DD43AEB185}">
       <dgm:prSet/>
       <dgm:spPr>
         <a:ln w="28575"/>
@@ -2329,184 +2447,7 @@
         </a:p>
       </dgm:t>
     </dgm:pt>
-    <dgm:pt modelId="{6D63B45A-FC4D-4D97-9646-1CB2E3183885}" type="sibTrans" cxnId="{727243D4-B079-419F-A83F-A9994986C37E}">
-      <dgm:prSet/>
-      <dgm:spPr/>
-      <dgm:t>
-        <a:bodyPr/>
-        <a:lstStyle/>
-        <a:p>
-          <a:endParaRPr lang="nl-NL"/>
-        </a:p>
-      </dgm:t>
-    </dgm:pt>
-    <dgm:pt modelId="{FA4799A0-A1A0-4F59-AD7B-E0EB6B8FFADF}">
-      <dgm:prSet custT="1"/>
-      <dgm:spPr>
-        <a:ln w="28575"/>
-      </dgm:spPr>
-      <dgm:t>
-        <a:bodyPr/>
-        <a:lstStyle/>
-        <a:p>
-          <a:r>
-            <a:rPr lang="en-US" sz="1800" dirty="0">
-              <a:solidFill>
-                <a:schemeClr val="tx1"/>
-              </a:solidFill>
-            </a:rPr>
-            <a:t>R, SPSS, or JASP</a:t>
-          </a:r>
-        </a:p>
-        <a:p>
-          <a:r>
-            <a:rPr lang="en-US" sz="1800" dirty="0">
-              <a:solidFill>
-                <a:schemeClr val="tx1"/>
-              </a:solidFill>
-            </a:rPr>
-            <a:t>N = 35</a:t>
-          </a:r>
-          <a:endParaRPr lang="nl-NL" sz="1800" dirty="0">
-            <a:solidFill>
-              <a:schemeClr val="tx1"/>
-            </a:solidFill>
-          </a:endParaRPr>
-        </a:p>
-      </dgm:t>
-    </dgm:pt>
-    <dgm:pt modelId="{16748D59-4592-47AE-975A-131BE08B71F4}" type="parTrans" cxnId="{1CD3B177-EFAD-4237-8CE6-FB53693D711D}">
-      <dgm:prSet/>
-      <dgm:spPr>
-        <a:ln w="28575"/>
-      </dgm:spPr>
-      <dgm:t>
-        <a:bodyPr/>
-        <a:lstStyle/>
-        <a:p>
-          <a:endParaRPr lang="nl-NL"/>
-        </a:p>
-      </dgm:t>
-    </dgm:pt>
-    <dgm:pt modelId="{2135DDFE-B1F9-4663-BADC-AD7DC105ACCF}" type="sibTrans" cxnId="{1CD3B177-EFAD-4237-8CE6-FB53693D711D}">
-      <dgm:prSet/>
-      <dgm:spPr/>
-      <dgm:t>
-        <a:bodyPr/>
-        <a:lstStyle/>
-        <a:p>
-          <a:endParaRPr lang="nl-NL"/>
-        </a:p>
-      </dgm:t>
-    </dgm:pt>
-    <dgm:pt modelId="{607FCB25-8266-4E8C-BB25-F6190E2C5A51}">
-      <dgm:prSet custT="1"/>
-      <dgm:spPr>
-        <a:ln w="28575"/>
-      </dgm:spPr>
-      <dgm:t>
-        <a:bodyPr/>
-        <a:lstStyle/>
-        <a:p>
-          <a:r>
-            <a:rPr lang="en-US" sz="1800" dirty="0">
-              <a:solidFill>
-                <a:schemeClr val="tx1"/>
-              </a:solidFill>
-            </a:rPr>
-            <a:t>Run Scripts</a:t>
-          </a:r>
-        </a:p>
-        <a:p>
-          <a:r>
-            <a:rPr lang="en-US" sz="1800" dirty="0">
-              <a:solidFill>
-                <a:schemeClr val="tx1"/>
-              </a:solidFill>
-            </a:rPr>
-            <a:t>N = 30</a:t>
-          </a:r>
-          <a:endParaRPr lang="nl-NL" sz="1800" dirty="0">
-            <a:solidFill>
-              <a:schemeClr val="tx1"/>
-            </a:solidFill>
-          </a:endParaRPr>
-        </a:p>
-      </dgm:t>
-    </dgm:pt>
-    <dgm:pt modelId="{B36DDFBD-93BC-4CD6-A52A-FC243FDC3227}" type="parTrans" cxnId="{1F88F132-FDC8-4FD4-B1AC-544E3716542B}">
-      <dgm:prSet/>
-      <dgm:spPr>
-        <a:ln w="28575"/>
-      </dgm:spPr>
-      <dgm:t>
-        <a:bodyPr/>
-        <a:lstStyle/>
-        <a:p>
-          <a:endParaRPr lang="nl-NL"/>
-        </a:p>
-      </dgm:t>
-    </dgm:pt>
-    <dgm:pt modelId="{F21C7168-A9F3-46E9-B8D7-54CC1203A00C}" type="sibTrans" cxnId="{1F88F132-FDC8-4FD4-B1AC-544E3716542B}">
-      <dgm:prSet/>
-      <dgm:spPr/>
-      <dgm:t>
-        <a:bodyPr/>
-        <a:lstStyle/>
-        <a:p>
-          <a:endParaRPr lang="nl-NL"/>
-        </a:p>
-      </dgm:t>
-    </dgm:pt>
-    <dgm:pt modelId="{9EBA7DD3-EFD4-4FB0-9D1D-F3CF4D51BB04}">
-      <dgm:prSet/>
-      <dgm:spPr>
-        <a:ln w="28575"/>
-      </dgm:spPr>
-      <dgm:t>
-        <a:bodyPr/>
-        <a:lstStyle/>
-        <a:p>
-          <a:r>
-            <a:rPr lang="en-US" dirty="0">
-              <a:solidFill>
-                <a:schemeClr val="tx1"/>
-              </a:solidFill>
-            </a:rPr>
-            <a:t>Reproducible</a:t>
-          </a:r>
-        </a:p>
-        <a:p>
-          <a:r>
-            <a:rPr lang="en-US" dirty="0">
-              <a:solidFill>
-                <a:schemeClr val="tx1"/>
-              </a:solidFill>
-            </a:rPr>
-            <a:t>N = 19</a:t>
-          </a:r>
-          <a:endParaRPr lang="nl-NL" dirty="0">
-            <a:solidFill>
-              <a:schemeClr val="tx1"/>
-            </a:solidFill>
-          </a:endParaRPr>
-        </a:p>
-      </dgm:t>
-    </dgm:pt>
-    <dgm:pt modelId="{7938C59D-E1DC-4C0F-871A-2C0CDC2677B9}" type="parTrans" cxnId="{0D05B572-5FD3-4E5A-9E27-1982552CA181}">
-      <dgm:prSet/>
-      <dgm:spPr>
-        <a:ln w="28575"/>
-      </dgm:spPr>
-      <dgm:t>
-        <a:bodyPr/>
-        <a:lstStyle/>
-        <a:p>
-          <a:endParaRPr lang="nl-NL"/>
-        </a:p>
-      </dgm:t>
-    </dgm:pt>
-    <dgm:pt modelId="{8AB2491D-65A1-4C50-8EF2-932E7B012D94}" type="sibTrans" cxnId="{0D05B572-5FD3-4E5A-9E27-1982552CA181}">
+    <dgm:pt modelId="{D375B26B-DAF8-49C5-AF37-53F35B330795}" type="sibTrans" cxnId="{390BFC48-DE66-4C05-9BC8-C4DD43AEB185}">
       <dgm:prSet/>
       <dgm:spPr/>
       <dgm:t>
@@ -2534,7 +2475,7 @@
       <dgm:spPr/>
     </dgm:pt>
     <dgm:pt modelId="{8CBF702C-68F8-444E-B80E-D98D6DC80C16}" type="pres">
-      <dgm:prSet presAssocID="{3C4A49FF-1CF0-458E-9BB0-7537638F50CB}" presName="LevelOneTextNode" presStyleLbl="node0" presStyleIdx="0" presStyleCnt="1" custScaleY="204179">
+      <dgm:prSet presAssocID="{3C4A49FF-1CF0-458E-9BB0-7537638F50CB}" presName="LevelOneTextNode" presStyleLbl="node0" presStyleIdx="0" presStyleCnt="1" custScaleY="219407" custLinFactNeighborX="654" custLinFactNeighborY="-66981">
         <dgm:presLayoutVars>
           <dgm:chPref val="3"/>
         </dgm:presLayoutVars>
@@ -2558,7 +2499,7 @@
       <dgm:spPr/>
     </dgm:pt>
     <dgm:pt modelId="{AE8F7343-D9EA-4FDB-8716-0D5BDCE3D032}" type="pres">
-      <dgm:prSet presAssocID="{C13768ED-4F37-4E15-8378-5BFEF9486274}" presName="LevelTwoTextNode" presStyleLbl="node2" presStyleIdx="0" presStyleCnt="2" custScaleY="152029" custLinFactNeighborX="-21803" custLinFactNeighborY="-33329">
+      <dgm:prSet presAssocID="{C13768ED-4F37-4E15-8378-5BFEF9486274}" presName="LevelTwoTextNode" presStyleLbl="node2" presStyleIdx="0" presStyleCnt="2" custScaleY="152029" custLinFactNeighborX="-21803" custLinFactNeighborY="-34188">
         <dgm:presLayoutVars>
           <dgm:chPref val="3"/>
         </dgm:presLayoutVars>
@@ -2594,11 +2535,11 @@
       <dgm:spPr/>
     </dgm:pt>
     <dgm:pt modelId="{ECF396D5-4EE2-4530-9DB5-64486FFC7106}" type="pres">
-      <dgm:prSet presAssocID="{7462DDD1-F283-42DB-AB71-270FC8A6AF1F}" presName="conn2-1" presStyleLbl="parChTrans1D4" presStyleIdx="0" presStyleCnt="7"/>
+      <dgm:prSet presAssocID="{7462DDD1-F283-42DB-AB71-270FC8A6AF1F}" presName="conn2-1" presStyleLbl="parChTrans1D4" presStyleIdx="0" presStyleCnt="6"/>
       <dgm:spPr/>
     </dgm:pt>
     <dgm:pt modelId="{0594B63C-F2DA-4B44-8FE5-D41D1D11F644}" type="pres">
-      <dgm:prSet presAssocID="{7462DDD1-F283-42DB-AB71-270FC8A6AF1F}" presName="connTx" presStyleLbl="parChTrans1D4" presStyleIdx="0" presStyleCnt="7"/>
+      <dgm:prSet presAssocID="{7462DDD1-F283-42DB-AB71-270FC8A6AF1F}" presName="connTx" presStyleLbl="parChTrans1D4" presStyleIdx="0" presStyleCnt="6"/>
       <dgm:spPr/>
     </dgm:pt>
     <dgm:pt modelId="{40685F52-4177-401F-ADA0-87AC4EABD88D}" type="pres">
@@ -2606,7 +2547,7 @@
       <dgm:spPr/>
     </dgm:pt>
     <dgm:pt modelId="{77403EC1-8879-4879-957E-C6EABCFA5DA0}" type="pres">
-      <dgm:prSet presAssocID="{35828132-24D6-4E8B-8159-362BEEDC9CEB}" presName="LevelTwoTextNode" presStyleLbl="node4" presStyleIdx="0" presStyleCnt="7" custScaleY="152919" custLinFactY="85428" custLinFactNeighborX="-47140" custLinFactNeighborY="100000">
+      <dgm:prSet presAssocID="{35828132-24D6-4E8B-8159-362BEEDC9CEB}" presName="LevelTwoTextNode" presStyleLbl="node4" presStyleIdx="0" presStyleCnt="6" custScaleY="138535" custLinFactY="38621" custLinFactNeighborX="-47140" custLinFactNeighborY="100000">
         <dgm:presLayoutVars>
           <dgm:chPref val="3"/>
         </dgm:presLayoutVars>
@@ -2617,148 +2558,124 @@
       <dgm:prSet presAssocID="{35828132-24D6-4E8B-8159-362BEEDC9CEB}" presName="level3hierChild" presStyleCnt="0"/>
       <dgm:spPr/>
     </dgm:pt>
-    <dgm:pt modelId="{4E636E47-392C-4DC5-BAEB-CDAC3C583442}" type="pres">
-      <dgm:prSet presAssocID="{B3CB0421-242B-4A01-8C14-F8DCD3C16DD1}" presName="conn2-1" presStyleLbl="parChTrans1D4" presStyleIdx="1" presStyleCnt="7"/>
-      <dgm:spPr/>
-    </dgm:pt>
-    <dgm:pt modelId="{6038CCFE-4A40-460F-A760-753FB678D58E}" type="pres">
-      <dgm:prSet presAssocID="{B3CB0421-242B-4A01-8C14-F8DCD3C16DD1}" presName="connTx" presStyleLbl="parChTrans1D4" presStyleIdx="1" presStyleCnt="7"/>
-      <dgm:spPr/>
-    </dgm:pt>
-    <dgm:pt modelId="{58C6D933-0693-4264-920C-78634A24901B}" type="pres">
-      <dgm:prSet presAssocID="{B783E18C-2602-48BA-A831-683DB3893F2F}" presName="root2" presStyleCnt="0"/>
-      <dgm:spPr/>
-    </dgm:pt>
-    <dgm:pt modelId="{38831AE3-CCD9-4520-8F76-E5803B5AEB04}" type="pres">
-      <dgm:prSet presAssocID="{B783E18C-2602-48BA-A831-683DB3893F2F}" presName="LevelTwoTextNode" presStyleLbl="node4" presStyleIdx="1" presStyleCnt="7" custScaleY="139441" custLinFactY="58163" custLinFactNeighborX="-67630" custLinFactNeighborY="100000">
+    <dgm:pt modelId="{AD360AC5-34E4-4AB2-A09B-1029900D6680}" type="pres">
+      <dgm:prSet presAssocID="{16748D59-4592-47AE-975A-131BE08B71F4}" presName="conn2-1" presStyleLbl="parChTrans1D4" presStyleIdx="1" presStyleCnt="6"/>
+      <dgm:spPr/>
+    </dgm:pt>
+    <dgm:pt modelId="{0B087112-D4C1-482F-BF6D-043E25641859}" type="pres">
+      <dgm:prSet presAssocID="{16748D59-4592-47AE-975A-131BE08B71F4}" presName="connTx" presStyleLbl="parChTrans1D4" presStyleIdx="1" presStyleCnt="6"/>
+      <dgm:spPr/>
+    </dgm:pt>
+    <dgm:pt modelId="{FF406E84-E8BE-453B-9B9F-E22F6CD2E3CB}" type="pres">
+      <dgm:prSet presAssocID="{FA4799A0-A1A0-4F59-AD7B-E0EB6B8FFADF}" presName="root2" presStyleCnt="0"/>
+      <dgm:spPr/>
+    </dgm:pt>
+    <dgm:pt modelId="{7A69C8F5-5B20-4243-82A0-432C2B1DD3A2}" type="pres">
+      <dgm:prSet presAssocID="{FA4799A0-A1A0-4F59-AD7B-E0EB6B8FFADF}" presName="LevelTwoTextNode" presStyleLbl="node4" presStyleIdx="1" presStyleCnt="6" custScaleY="217779" custLinFactY="116302" custLinFactNeighborX="-67453" custLinFactNeighborY="200000">
         <dgm:presLayoutVars>
           <dgm:chPref val="3"/>
         </dgm:presLayoutVars>
       </dgm:prSet>
       <dgm:spPr/>
     </dgm:pt>
-    <dgm:pt modelId="{2A2801A0-1B00-4858-B797-5FF72E1967FE}" type="pres">
-      <dgm:prSet presAssocID="{B783E18C-2602-48BA-A831-683DB3893F2F}" presName="level3hierChild" presStyleCnt="0"/>
-      <dgm:spPr/>
-    </dgm:pt>
-    <dgm:pt modelId="{AD360AC5-34E4-4AB2-A09B-1029900D6680}" type="pres">
-      <dgm:prSet presAssocID="{16748D59-4592-47AE-975A-131BE08B71F4}" presName="conn2-1" presStyleLbl="parChTrans1D4" presStyleIdx="2" presStyleCnt="7"/>
-      <dgm:spPr/>
-    </dgm:pt>
-    <dgm:pt modelId="{0B087112-D4C1-482F-BF6D-043E25641859}" type="pres">
-      <dgm:prSet presAssocID="{16748D59-4592-47AE-975A-131BE08B71F4}" presName="connTx" presStyleLbl="parChTrans1D4" presStyleIdx="2" presStyleCnt="7"/>
-      <dgm:spPr/>
-    </dgm:pt>
-    <dgm:pt modelId="{FF406E84-E8BE-453B-9B9F-E22F6CD2E3CB}" type="pres">
-      <dgm:prSet presAssocID="{FA4799A0-A1A0-4F59-AD7B-E0EB6B8FFADF}" presName="root2" presStyleCnt="0"/>
-      <dgm:spPr/>
-    </dgm:pt>
-    <dgm:pt modelId="{7A69C8F5-5B20-4243-82A0-432C2B1DD3A2}" type="pres">
-      <dgm:prSet presAssocID="{FA4799A0-A1A0-4F59-AD7B-E0EB6B8FFADF}" presName="LevelTwoTextNode" presStyleLbl="node4" presStyleIdx="2" presStyleCnt="7" custScaleY="143668" custLinFactY="81398" custLinFactNeighborX="-67608" custLinFactNeighborY="100000">
+    <dgm:pt modelId="{F08D7682-E9B4-492D-8D65-3C8EFA8455C4}" type="pres">
+      <dgm:prSet presAssocID="{FA4799A0-A1A0-4F59-AD7B-E0EB6B8FFADF}" presName="level3hierChild" presStyleCnt="0"/>
+      <dgm:spPr/>
+    </dgm:pt>
+    <dgm:pt modelId="{A2965524-5BE6-4805-A284-EBDF70C80049}" type="pres">
+      <dgm:prSet presAssocID="{B36DDFBD-93BC-4CD6-A52A-FC243FDC3227}" presName="conn2-1" presStyleLbl="parChTrans1D4" presStyleIdx="2" presStyleCnt="6"/>
+      <dgm:spPr/>
+    </dgm:pt>
+    <dgm:pt modelId="{04A7B3FA-A91F-4891-8CDA-E213F66C13E5}" type="pres">
+      <dgm:prSet presAssocID="{B36DDFBD-93BC-4CD6-A52A-FC243FDC3227}" presName="connTx" presStyleLbl="parChTrans1D4" presStyleIdx="2" presStyleCnt="6"/>
+      <dgm:spPr/>
+    </dgm:pt>
+    <dgm:pt modelId="{4EE0EBEE-F303-4E88-882D-4CC42C68D138}" type="pres">
+      <dgm:prSet presAssocID="{607FCB25-8266-4E8C-BB25-F6190E2C5A51}" presName="root2" presStyleCnt="0"/>
+      <dgm:spPr/>
+    </dgm:pt>
+    <dgm:pt modelId="{D6DCFFF0-C6DD-41F7-B3B4-9FD4BB929B39}" type="pres">
+      <dgm:prSet presAssocID="{607FCB25-8266-4E8C-BB25-F6190E2C5A51}" presName="LevelTwoTextNode" presStyleLbl="node4" presStyleIdx="2" presStyleCnt="6" custLinFactY="116748" custLinFactNeighborX="-89875" custLinFactNeighborY="200000">
         <dgm:presLayoutVars>
           <dgm:chPref val="3"/>
         </dgm:presLayoutVars>
       </dgm:prSet>
       <dgm:spPr/>
     </dgm:pt>
-    <dgm:pt modelId="{F08D7682-E9B4-492D-8D65-3C8EFA8455C4}" type="pres">
-      <dgm:prSet presAssocID="{FA4799A0-A1A0-4F59-AD7B-E0EB6B8FFADF}" presName="level3hierChild" presStyleCnt="0"/>
-      <dgm:spPr/>
-    </dgm:pt>
-    <dgm:pt modelId="{A2965524-5BE6-4805-A284-EBDF70C80049}" type="pres">
-      <dgm:prSet presAssocID="{B36DDFBD-93BC-4CD6-A52A-FC243FDC3227}" presName="conn2-1" presStyleLbl="parChTrans1D4" presStyleIdx="3" presStyleCnt="7"/>
-      <dgm:spPr/>
-    </dgm:pt>
-    <dgm:pt modelId="{04A7B3FA-A91F-4891-8CDA-E213F66C13E5}" type="pres">
-      <dgm:prSet presAssocID="{B36DDFBD-93BC-4CD6-A52A-FC243FDC3227}" presName="connTx" presStyleLbl="parChTrans1D4" presStyleIdx="3" presStyleCnt="7"/>
-      <dgm:spPr/>
-    </dgm:pt>
-    <dgm:pt modelId="{4EE0EBEE-F303-4E88-882D-4CC42C68D138}" type="pres">
-      <dgm:prSet presAssocID="{607FCB25-8266-4E8C-BB25-F6190E2C5A51}" presName="root2" presStyleCnt="0"/>
-      <dgm:spPr/>
-    </dgm:pt>
-    <dgm:pt modelId="{D6DCFFF0-C6DD-41F7-B3B4-9FD4BB929B39}" type="pres">
-      <dgm:prSet presAssocID="{607FCB25-8266-4E8C-BB25-F6190E2C5A51}" presName="LevelTwoTextNode" presStyleLbl="node4" presStyleIdx="3" presStyleCnt="7" custLinFactY="81010" custLinFactNeighborX="-85147" custLinFactNeighborY="100000">
+    <dgm:pt modelId="{61A4C9FC-DF3D-402E-B214-0FEE32C75CC0}" type="pres">
+      <dgm:prSet presAssocID="{607FCB25-8266-4E8C-BB25-F6190E2C5A51}" presName="level3hierChild" presStyleCnt="0"/>
+      <dgm:spPr/>
+    </dgm:pt>
+    <dgm:pt modelId="{0CF40186-A589-4771-8A76-9570FCF1EF43}" type="pres">
+      <dgm:prSet presAssocID="{7938C59D-E1DC-4C0F-871A-2C0CDC2677B9}" presName="conn2-1" presStyleLbl="parChTrans1D4" presStyleIdx="3" presStyleCnt="6"/>
+      <dgm:spPr/>
+    </dgm:pt>
+    <dgm:pt modelId="{3EFA9C6E-6E9D-4268-8937-B6D1ED2FE8CE}" type="pres">
+      <dgm:prSet presAssocID="{7938C59D-E1DC-4C0F-871A-2C0CDC2677B9}" presName="connTx" presStyleLbl="parChTrans1D4" presStyleIdx="3" presStyleCnt="6"/>
+      <dgm:spPr/>
+    </dgm:pt>
+    <dgm:pt modelId="{50BED78C-A144-43D4-9A3E-0518A1DBEDDF}" type="pres">
+      <dgm:prSet presAssocID="{9EBA7DD3-EFD4-4FB0-9D1D-F3CF4D51BB04}" presName="root2" presStyleCnt="0"/>
+      <dgm:spPr/>
+    </dgm:pt>
+    <dgm:pt modelId="{064C1D77-3277-489D-9811-9D89200A3D1D}" type="pres">
+      <dgm:prSet presAssocID="{9EBA7DD3-EFD4-4FB0-9D1D-F3CF4D51BB04}" presName="LevelTwoTextNode" presStyleLbl="node4" presStyleIdx="3" presStyleCnt="6" custLinFactX="-13128" custLinFactY="116482" custLinFactNeighborX="-100000" custLinFactNeighborY="200000">
         <dgm:presLayoutVars>
           <dgm:chPref val="3"/>
         </dgm:presLayoutVars>
       </dgm:prSet>
       <dgm:spPr/>
     </dgm:pt>
-    <dgm:pt modelId="{61A4C9FC-DF3D-402E-B214-0FEE32C75CC0}" type="pres">
-      <dgm:prSet presAssocID="{607FCB25-8266-4E8C-BB25-F6190E2C5A51}" presName="level3hierChild" presStyleCnt="0"/>
-      <dgm:spPr/>
-    </dgm:pt>
-    <dgm:pt modelId="{0CF40186-A589-4771-8A76-9570FCF1EF43}" type="pres">
-      <dgm:prSet presAssocID="{7938C59D-E1DC-4C0F-871A-2C0CDC2677B9}" presName="conn2-1" presStyleLbl="parChTrans1D4" presStyleIdx="4" presStyleCnt="7"/>
-      <dgm:spPr/>
-    </dgm:pt>
-    <dgm:pt modelId="{3EFA9C6E-6E9D-4268-8937-B6D1ED2FE8CE}" type="pres">
-      <dgm:prSet presAssocID="{7938C59D-E1DC-4C0F-871A-2C0CDC2677B9}" presName="connTx" presStyleLbl="parChTrans1D4" presStyleIdx="4" presStyleCnt="7"/>
-      <dgm:spPr/>
-    </dgm:pt>
-    <dgm:pt modelId="{50BED78C-A144-43D4-9A3E-0518A1DBEDDF}" type="pres">
-      <dgm:prSet presAssocID="{9EBA7DD3-EFD4-4FB0-9D1D-F3CF4D51BB04}" presName="root2" presStyleCnt="0"/>
-      <dgm:spPr/>
-    </dgm:pt>
-    <dgm:pt modelId="{064C1D77-3277-489D-9811-9D89200A3D1D}" type="pres">
-      <dgm:prSet presAssocID="{9EBA7DD3-EFD4-4FB0-9D1D-F3CF4D51BB04}" presName="LevelTwoTextNode" presStyleLbl="node4" presStyleIdx="4" presStyleCnt="7" custLinFactX="-3247" custLinFactY="80186" custLinFactNeighborX="-100000" custLinFactNeighborY="100000">
+    <dgm:pt modelId="{A19CD48D-3843-4B10-96AF-387A8F6B4F4D}" type="pres">
+      <dgm:prSet presAssocID="{9EBA7DD3-EFD4-4FB0-9D1D-F3CF4D51BB04}" presName="level3hierChild" presStyleCnt="0"/>
+      <dgm:spPr/>
+    </dgm:pt>
+    <dgm:pt modelId="{3A85B887-1D18-4D6D-8AE5-841271FDB0C0}" type="pres">
+      <dgm:prSet presAssocID="{E7F01257-8479-40BF-8579-A2A2FF300C3A}" presName="conn2-1" presStyleLbl="parChTrans1D4" presStyleIdx="4" presStyleCnt="6"/>
+      <dgm:spPr/>
+    </dgm:pt>
+    <dgm:pt modelId="{3739AAC3-4A73-4A02-925D-4BAAFBE98A63}" type="pres">
+      <dgm:prSet presAssocID="{E7F01257-8479-40BF-8579-A2A2FF300C3A}" presName="connTx" presStyleLbl="parChTrans1D4" presStyleIdx="4" presStyleCnt="6"/>
+      <dgm:spPr/>
+    </dgm:pt>
+    <dgm:pt modelId="{1C1D9F12-4019-42E5-9FA9-B99C9AEE8EF3}" type="pres">
+      <dgm:prSet presAssocID="{A243FECC-01F6-47EF-A427-18D141536F62}" presName="root2" presStyleCnt="0"/>
+      <dgm:spPr/>
+    </dgm:pt>
+    <dgm:pt modelId="{436EDD92-DA6A-4B27-B901-189C516DE422}" type="pres">
+      <dgm:prSet presAssocID="{A243FECC-01F6-47EF-A427-18D141536F62}" presName="LevelTwoTextNode" presStyleLbl="node4" presStyleIdx="4" presStyleCnt="6" custScaleY="146716" custLinFactY="125533" custLinFactNeighborX="-47140" custLinFactNeighborY="200000">
         <dgm:presLayoutVars>
           <dgm:chPref val="3"/>
         </dgm:presLayoutVars>
       </dgm:prSet>
       <dgm:spPr/>
     </dgm:pt>
-    <dgm:pt modelId="{A19CD48D-3843-4B10-96AF-387A8F6B4F4D}" type="pres">
-      <dgm:prSet presAssocID="{9EBA7DD3-EFD4-4FB0-9D1D-F3CF4D51BB04}" presName="level3hierChild" presStyleCnt="0"/>
-      <dgm:spPr/>
-    </dgm:pt>
-    <dgm:pt modelId="{3A85B887-1D18-4D6D-8AE5-841271FDB0C0}" type="pres">
-      <dgm:prSet presAssocID="{E7F01257-8479-40BF-8579-A2A2FF300C3A}" presName="conn2-1" presStyleLbl="parChTrans1D4" presStyleIdx="5" presStyleCnt="7"/>
-      <dgm:spPr/>
-    </dgm:pt>
-    <dgm:pt modelId="{3739AAC3-4A73-4A02-925D-4BAAFBE98A63}" type="pres">
-      <dgm:prSet presAssocID="{E7F01257-8479-40BF-8579-A2A2FF300C3A}" presName="connTx" presStyleLbl="parChTrans1D4" presStyleIdx="5" presStyleCnt="7"/>
-      <dgm:spPr/>
-    </dgm:pt>
-    <dgm:pt modelId="{1C1D9F12-4019-42E5-9FA9-B99C9AEE8EF3}" type="pres">
-      <dgm:prSet presAssocID="{A243FECC-01F6-47EF-A427-18D141536F62}" presName="root2" presStyleCnt="0"/>
-      <dgm:spPr/>
-    </dgm:pt>
-    <dgm:pt modelId="{436EDD92-DA6A-4B27-B901-189C516DE422}" type="pres">
-      <dgm:prSet presAssocID="{A243FECC-01F6-47EF-A427-18D141536F62}" presName="LevelTwoTextNode" presStyleLbl="node4" presStyleIdx="5" presStyleCnt="7" custScaleY="167336" custLinFactY="41571" custLinFactNeighborX="-47140" custLinFactNeighborY="100000">
+    <dgm:pt modelId="{41282A31-3DA5-4447-A325-0D0ACBEB8D43}" type="pres">
+      <dgm:prSet presAssocID="{A243FECC-01F6-47EF-A427-18D141536F62}" presName="level3hierChild" presStyleCnt="0"/>
+      <dgm:spPr/>
+    </dgm:pt>
+    <dgm:pt modelId="{6916750A-C3C3-4973-BA63-D0DC2D57C12A}" type="pres">
+      <dgm:prSet presAssocID="{2877F2C1-5503-4641-AB48-7F67E569974D}" presName="conn2-1" presStyleLbl="parChTrans1D4" presStyleIdx="5" presStyleCnt="6"/>
+      <dgm:spPr/>
+    </dgm:pt>
+    <dgm:pt modelId="{C032E276-1115-4663-B80E-84F734612122}" type="pres">
+      <dgm:prSet presAssocID="{2877F2C1-5503-4641-AB48-7F67E569974D}" presName="connTx" presStyleLbl="parChTrans1D4" presStyleIdx="5" presStyleCnt="6"/>
+      <dgm:spPr/>
+    </dgm:pt>
+    <dgm:pt modelId="{97B1AB52-3912-4F0E-BF40-872DE3854C10}" type="pres">
+      <dgm:prSet presAssocID="{E2D7F6EE-B8EA-4AC5-9F23-A58A00294E2D}" presName="root2" presStyleCnt="0"/>
+      <dgm:spPr/>
+    </dgm:pt>
+    <dgm:pt modelId="{A7BD74AC-B185-4330-ACE4-F5A53E4B3F1C}" type="pres">
+      <dgm:prSet presAssocID="{E2D7F6EE-B8EA-4AC5-9F23-A58A00294E2D}" presName="LevelTwoTextNode" presStyleLbl="node4" presStyleIdx="5" presStyleCnt="6" custScaleY="136708" custLinFactNeighborX="-47140" custLinFactNeighborY="-6871">
         <dgm:presLayoutVars>
           <dgm:chPref val="3"/>
         </dgm:presLayoutVars>
       </dgm:prSet>
       <dgm:spPr/>
     </dgm:pt>
-    <dgm:pt modelId="{41282A31-3DA5-4447-A325-0D0ACBEB8D43}" type="pres">
-      <dgm:prSet presAssocID="{A243FECC-01F6-47EF-A427-18D141536F62}" presName="level3hierChild" presStyleCnt="0"/>
-      <dgm:spPr/>
-    </dgm:pt>
-    <dgm:pt modelId="{AE383538-6B8D-480B-B140-11130A077716}" type="pres">
-      <dgm:prSet presAssocID="{9343353A-BBEE-4C98-B9B8-5461F652185E}" presName="conn2-1" presStyleLbl="parChTrans1D4" presStyleIdx="6" presStyleCnt="7"/>
-      <dgm:spPr/>
-    </dgm:pt>
-    <dgm:pt modelId="{CD6ABDF5-0442-4DC2-99ED-3AF1E712BD43}" type="pres">
-      <dgm:prSet presAssocID="{9343353A-BBEE-4C98-B9B8-5461F652185E}" presName="connTx" presStyleLbl="parChTrans1D4" presStyleIdx="6" presStyleCnt="7"/>
-      <dgm:spPr/>
-    </dgm:pt>
-    <dgm:pt modelId="{082A36FC-A602-42B9-A3AF-B865342C6AE1}" type="pres">
-      <dgm:prSet presAssocID="{0BC1B8F2-4F37-45C9-803C-8D0D7FF5FB7C}" presName="root2" presStyleCnt="0"/>
-      <dgm:spPr/>
-    </dgm:pt>
-    <dgm:pt modelId="{F64A791C-00A4-432F-9090-52BCD216B8B8}" type="pres">
-      <dgm:prSet presAssocID="{0BC1B8F2-4F37-45C9-803C-8D0D7FF5FB7C}" presName="LevelTwoTextNode" presStyleLbl="node4" presStyleIdx="6" presStyleCnt="7" custScaleY="146279" custLinFactY="100000" custLinFactNeighborX="-67630" custLinFactNeighborY="100911">
-        <dgm:presLayoutVars>
-          <dgm:chPref val="3"/>
-        </dgm:presLayoutVars>
-      </dgm:prSet>
-      <dgm:spPr/>
-    </dgm:pt>
-    <dgm:pt modelId="{48F38923-B6AA-4A68-8B56-F0FA9AC4936D}" type="pres">
-      <dgm:prSet presAssocID="{0BC1B8F2-4F37-45C9-803C-8D0D7FF5FB7C}" presName="level3hierChild" presStyleCnt="0"/>
+    <dgm:pt modelId="{1CE3DD6E-57E2-4464-B3F2-A49B35D248FC}" type="pres">
+      <dgm:prSet presAssocID="{E2D7F6EE-B8EA-4AC5-9F23-A58A00294E2D}" presName="level3hierChild" presStyleCnt="0"/>
       <dgm:spPr/>
     </dgm:pt>
     <dgm:pt modelId="{47516D7C-106F-4664-A550-6DAB42875566}" type="pres">
@@ -2822,7 +2739,7 @@
       <dgm:spPr/>
     </dgm:pt>
     <dgm:pt modelId="{08CC485B-8473-4547-A6DE-FFFA16734FA0}" type="pres">
-      <dgm:prSet presAssocID="{4F908973-2012-4DBF-94AD-2D00FD02D88A}" presName="LevelTwoTextNode" presStyleLbl="node2" presStyleIdx="1" presStyleCnt="2" custScaleY="156655" custLinFactNeighborX="-22626" custLinFactNeighborY="-12341">
+      <dgm:prSet presAssocID="{4F908973-2012-4DBF-94AD-2D00FD02D88A}" presName="LevelTwoTextNode" presStyleLbl="node2" presStyleIdx="1" presStyleCnt="2" custScaleY="156655" custLinFactNeighborX="-21338" custLinFactNeighborY="-14925">
         <dgm:presLayoutVars>
           <dgm:chPref val="3"/>
         </dgm:presLayoutVars>
@@ -2838,7 +2755,6 @@
     <dgm:cxn modelId="{1E73CD0B-742D-4E74-AAFC-5ABDB9786C08}" type="presOf" srcId="{B36DDFBD-93BC-4CD6-A52A-FC243FDC3227}" destId="{04A7B3FA-A91F-4891-8CDA-E213F66C13E5}" srcOrd="1" destOrd="0" presId="urn:microsoft.com/office/officeart/2005/8/layout/hierarchy2"/>
     <dgm:cxn modelId="{A1EE6A0D-5353-47FF-9DD5-F03D19076821}" srcId="{C24DF979-2D66-4345-A50F-2F65E68548CC}" destId="{35828132-24D6-4E8B-8159-362BEEDC9CEB}" srcOrd="0" destOrd="0" parTransId="{7462DDD1-F283-42DB-AB71-270FC8A6AF1F}" sibTransId="{89FCA33B-7242-4EBA-A6D8-8E97DCFF9048}"/>
     <dgm:cxn modelId="{1F82050E-4EFD-4601-BEFD-74A0E3DD0D27}" type="presOf" srcId="{16748D59-4592-47AE-975A-131BE08B71F4}" destId="{0B087112-D4C1-482F-BF6D-043E25641859}" srcOrd="1" destOrd="0" presId="urn:microsoft.com/office/officeart/2005/8/layout/hierarchy2"/>
-    <dgm:cxn modelId="{537D7D11-C4C0-4092-8481-DE42AA7433DB}" type="presOf" srcId="{B3CB0421-242B-4A01-8C14-F8DCD3C16DD1}" destId="{6038CCFE-4A40-460F-A760-753FB678D58E}" srcOrd="1" destOrd="0" presId="urn:microsoft.com/office/officeart/2005/8/layout/hierarchy2"/>
     <dgm:cxn modelId="{D8A2F117-384C-4165-8268-4A69DB2E9135}" srcId="{3C4A49FF-1CF0-458E-9BB0-7537638F50CB}" destId="{C13768ED-4F37-4E15-8378-5BFEF9486274}" srcOrd="0" destOrd="0" parTransId="{83925042-6A1C-4CB7-992F-2E8D64EEB9B1}" sibTransId="{65FAEE98-8488-47E1-9443-FC4487257AF9}"/>
     <dgm:cxn modelId="{C8B0A31D-4C3D-4596-998A-2DF04B76AFF1}" type="presOf" srcId="{3C4A49FF-1CF0-458E-9BB0-7537638F50CB}" destId="{8CBF702C-68F8-444E-B80E-D98D6DC80C16}" srcOrd="0" destOrd="0" presId="urn:microsoft.com/office/officeart/2005/8/layout/hierarchy2"/>
     <dgm:cxn modelId="{05D2D01E-75E7-4897-AD2D-57B37754151E}" type="presOf" srcId="{7938C59D-E1DC-4C0F-871A-2C0CDC2677B9}" destId="{0CF40186-A589-4771-8A76-9570FCF1EF43}" srcOrd="0" destOrd="0" presId="urn:microsoft.com/office/officeart/2005/8/layout/hierarchy2"/>
@@ -2847,45 +2763,42 @@
     <dgm:cxn modelId="{1F88F132-FDC8-4FD4-B1AC-544E3716542B}" srcId="{FA4799A0-A1A0-4F59-AD7B-E0EB6B8FFADF}" destId="{607FCB25-8266-4E8C-BB25-F6190E2C5A51}" srcOrd="0" destOrd="0" parTransId="{B36DDFBD-93BC-4CD6-A52A-FC243FDC3227}" sibTransId="{F21C7168-A9F3-46E9-B8D7-54CC1203A00C}"/>
     <dgm:cxn modelId="{5B02BB34-B2A0-4499-A575-91F25DD97702}" type="presOf" srcId="{7462DDD1-F283-42DB-AB71-270FC8A6AF1F}" destId="{0594B63C-F2DA-4B44-8FE5-D41D1D11F644}" srcOrd="1" destOrd="0" presId="urn:microsoft.com/office/officeart/2005/8/layout/hierarchy2"/>
     <dgm:cxn modelId="{8B27D937-ACCE-44A4-8B42-C167F60038E3}" type="presOf" srcId="{7938C59D-E1DC-4C0F-871A-2C0CDC2677B9}" destId="{3EFA9C6E-6E9D-4268-8937-B6D1ED2FE8CE}" srcOrd="1" destOrd="0" presId="urn:microsoft.com/office/officeart/2005/8/layout/hierarchy2"/>
-    <dgm:cxn modelId="{5FA9FD3C-9796-4B2C-9F9A-540CABEFE920}" type="presOf" srcId="{0BC1B8F2-4F37-45C9-803C-8D0D7FF5FB7C}" destId="{F64A791C-00A4-432F-9090-52BCD216B8B8}" srcOrd="0" destOrd="0" presId="urn:microsoft.com/office/officeart/2005/8/layout/hierarchy2"/>
     <dgm:cxn modelId="{3E5DB13E-8AB1-4A5C-A467-F2A90CA763F3}" type="presOf" srcId="{35828132-24D6-4E8B-8159-362BEEDC9CEB}" destId="{77403EC1-8879-4879-957E-C6EABCFA5DA0}" srcOrd="0" destOrd="0" presId="urn:microsoft.com/office/officeart/2005/8/layout/hierarchy2"/>
     <dgm:cxn modelId="{C8F66D3F-6881-4D0B-AC69-185B1B8BB710}" srcId="{C13768ED-4F37-4E15-8378-5BFEF9486274}" destId="{A836B913-61AC-469F-A301-4D9ACEDA89C9}" srcOrd="2" destOrd="0" parTransId="{11697691-F860-47DB-9C18-0ED146C2F1DC}" sibTransId="{3005CDDE-7D83-443E-8486-1A1BBCA63BDE}"/>
     <dgm:cxn modelId="{B354A340-B375-4C74-B782-E1D76E6A02D2}" type="presOf" srcId="{08927EF9-BA2F-4AED-B168-41E724AB3C5B}" destId="{19E51B11-34C1-4922-99E3-02A46FF61989}" srcOrd="1" destOrd="0" presId="urn:microsoft.com/office/officeart/2005/8/layout/hierarchy2"/>
     <dgm:cxn modelId="{2200E962-7824-4836-B272-98AB36497EF7}" type="presOf" srcId="{F6FF3177-E858-40BE-B66A-0AF1F75AA728}" destId="{1858F3F4-C123-4A53-967B-FE5BF7782A5E}" srcOrd="0" destOrd="0" presId="urn:microsoft.com/office/officeart/2005/8/layout/hierarchy2"/>
     <dgm:cxn modelId="{72C75864-2FB0-434E-9242-C9CBEDD48DAD}" type="presOf" srcId="{9EBA7DD3-EFD4-4FB0-9D1D-F3CF4D51BB04}" destId="{064C1D77-3277-489D-9811-9D89200A3D1D}" srcOrd="0" destOrd="0" presId="urn:microsoft.com/office/officeart/2005/8/layout/hierarchy2"/>
     <dgm:cxn modelId="{F9BBF965-C464-458B-B4F9-9BA2823961BA}" type="presOf" srcId="{614616D1-9AB0-4825-B4F0-E3B319A8A19C}" destId="{DD6DBAF4-F6AE-4D06-88B8-13D9764C7A2C}" srcOrd="0" destOrd="0" presId="urn:microsoft.com/office/officeart/2005/8/layout/hierarchy2"/>
-    <dgm:cxn modelId="{AC807B4E-7580-492F-9B85-F99DDD7282E4}" type="presOf" srcId="{B3CB0421-242B-4A01-8C14-F8DCD3C16DD1}" destId="{4E636E47-392C-4DC5-BAEB-CDAC3C583442}" srcOrd="0" destOrd="0" presId="urn:microsoft.com/office/officeart/2005/8/layout/hierarchy2"/>
+    <dgm:cxn modelId="{390BFC48-DE66-4C05-9BC8-C4DD43AEB185}" srcId="{C24DF979-2D66-4345-A50F-2F65E68548CC}" destId="{E2D7F6EE-B8EA-4AC5-9F23-A58A00294E2D}" srcOrd="2" destOrd="0" parTransId="{2877F2C1-5503-4641-AB48-7F67E569974D}" sibTransId="{D375B26B-DAF8-49C5-AF37-53F35B330795}"/>
     <dgm:cxn modelId="{EF4B126F-6171-49E8-A854-4E93EA3DFDDD}" type="presOf" srcId="{185DEF35-D85D-43CD-837E-5BF53272E01D}" destId="{2EF889EC-3B6A-4D2F-84DA-6AB625664518}" srcOrd="1" destOrd="0" presId="urn:microsoft.com/office/officeart/2005/8/layout/hierarchy2"/>
     <dgm:cxn modelId="{8C449950-8A5F-4126-8AC4-C1F767A75770}" type="presOf" srcId="{11697691-F860-47DB-9C18-0ED146C2F1DC}" destId="{E6F0BE2B-F366-41B1-9D46-5823E00C7E97}" srcOrd="1" destOrd="0" presId="urn:microsoft.com/office/officeart/2005/8/layout/hierarchy2"/>
-    <dgm:cxn modelId="{210E2571-C061-4EE7-840C-979980AB4021}" type="presOf" srcId="{B783E18C-2602-48BA-A831-683DB3893F2F}" destId="{38831AE3-CCD9-4520-8F76-E5803B5AEB04}" srcOrd="0" destOrd="0" presId="urn:microsoft.com/office/officeart/2005/8/layout/hierarchy2"/>
     <dgm:cxn modelId="{55EB5351-28B7-4C10-877A-B6DA9C569F60}" type="presOf" srcId="{4F908973-2012-4DBF-94AD-2D00FD02D88A}" destId="{08CC485B-8473-4547-A6DE-FFFA16734FA0}" srcOrd="0" destOrd="0" presId="urn:microsoft.com/office/officeart/2005/8/layout/hierarchy2"/>
     <dgm:cxn modelId="{0D05B572-5FD3-4E5A-9E27-1982552CA181}" srcId="{607FCB25-8266-4E8C-BB25-F6190E2C5A51}" destId="{9EBA7DD3-EFD4-4FB0-9D1D-F3CF4D51BB04}" srcOrd="0" destOrd="0" parTransId="{7938C59D-E1DC-4C0F-871A-2C0CDC2677B9}" sibTransId="{8AB2491D-65A1-4C50-8EF2-932E7B012D94}"/>
     <dgm:cxn modelId="{26EB9554-EFD1-492C-AE38-D158D8BB363F}" srcId="{C24DF979-2D66-4345-A50F-2F65E68548CC}" destId="{A243FECC-01F6-47EF-A427-18D141536F62}" srcOrd="1" destOrd="0" parTransId="{E7F01257-8479-40BF-8579-A2A2FF300C3A}" sibTransId="{FE9DD013-0F42-4831-90D6-3605B26898C2}"/>
     <dgm:cxn modelId="{DBF2E775-68E7-4FD5-854F-032982ECEBD9}" type="presOf" srcId="{08927EF9-BA2F-4AED-B168-41E724AB3C5B}" destId="{47516D7C-106F-4664-A550-6DAB42875566}" srcOrd="0" destOrd="0" presId="urn:microsoft.com/office/officeart/2005/8/layout/hierarchy2"/>
     <dgm:cxn modelId="{5DC64557-5912-450C-8A79-CC6F0483BF64}" type="presOf" srcId="{B36DDFBD-93BC-4CD6-A52A-FC243FDC3227}" destId="{A2965524-5BE6-4805-A284-EBDF70C80049}" srcOrd="0" destOrd="0" presId="urn:microsoft.com/office/officeart/2005/8/layout/hierarchy2"/>
-    <dgm:cxn modelId="{1CD3B177-EFAD-4237-8CE6-FB53693D711D}" srcId="{35828132-24D6-4E8B-8159-362BEEDC9CEB}" destId="{FA4799A0-A1A0-4F59-AD7B-E0EB6B8FFADF}" srcOrd="1" destOrd="0" parTransId="{16748D59-4592-47AE-975A-131BE08B71F4}" sibTransId="{2135DDFE-B1F9-4663-BADC-AD7DC105ACCF}"/>
+    <dgm:cxn modelId="{1CD3B177-EFAD-4237-8CE6-FB53693D711D}" srcId="{35828132-24D6-4E8B-8159-362BEEDC9CEB}" destId="{FA4799A0-A1A0-4F59-AD7B-E0EB6B8FFADF}" srcOrd="0" destOrd="0" parTransId="{16748D59-4592-47AE-975A-131BE08B71F4}" sibTransId="{2135DDFE-B1F9-4663-BADC-AD7DC105ACCF}"/>
     <dgm:cxn modelId="{B223F882-4B46-4707-88E7-7A07CF22A624}" type="presOf" srcId="{E7F01257-8479-40BF-8579-A2A2FF300C3A}" destId="{3A85B887-1D18-4D6D-8AE5-841271FDB0C0}" srcOrd="0" destOrd="0" presId="urn:microsoft.com/office/officeart/2005/8/layout/hierarchy2"/>
     <dgm:cxn modelId="{8F239883-3A26-4351-93E6-1808DDCC9F44}" type="presOf" srcId="{6E459ED9-2F4B-4DCD-81D9-EC7B4C076809}" destId="{CCA956CC-2F0D-490E-8442-0D9607B1D492}" srcOrd="0" destOrd="0" presId="urn:microsoft.com/office/officeart/2005/8/layout/hierarchy2"/>
-    <dgm:cxn modelId="{284A528A-F325-45CB-9BD0-6389D04D687B}" type="presOf" srcId="{9343353A-BBEE-4C98-B9B8-5461F652185E}" destId="{AE383538-6B8D-480B-B140-11130A077716}" srcOrd="0" destOrd="0" presId="urn:microsoft.com/office/officeart/2005/8/layout/hierarchy2"/>
     <dgm:cxn modelId="{A75A0791-CAA7-45BB-B5C3-C39C270402DF}" type="presOf" srcId="{A836B913-61AC-469F-A301-4D9ACEDA89C9}" destId="{72E97099-95D0-43A9-A70F-C3FFA1BDAD4B}" srcOrd="0" destOrd="0" presId="urn:microsoft.com/office/officeart/2005/8/layout/hierarchy2"/>
     <dgm:cxn modelId="{0A24EE94-5348-4BA2-9CD7-B099531DBC83}" srcId="{6E459ED9-2F4B-4DCD-81D9-EC7B4C076809}" destId="{3C4A49FF-1CF0-458E-9BB0-7537638F50CB}" srcOrd="0" destOrd="0" parTransId="{C839F144-8B6F-4111-B5FB-C98504A13890}" sibTransId="{8F802141-233B-461F-BEAD-67E38299A1D3}"/>
     <dgm:cxn modelId="{2A381196-7456-4890-A6A1-28BB8E23A420}" type="presOf" srcId="{83925042-6A1C-4CB7-992F-2E8D64EEB9B1}" destId="{A0373647-8495-4AD7-9232-CCECAE989C18}" srcOrd="0" destOrd="0" presId="urn:microsoft.com/office/officeart/2005/8/layout/hierarchy2"/>
+    <dgm:cxn modelId="{69A330A0-1924-4D77-A057-6572793DF06F}" type="presOf" srcId="{2877F2C1-5503-4641-AB48-7F67E569974D}" destId="{6916750A-C3C3-4973-BA63-D0DC2D57C12A}" srcOrd="0" destOrd="0" presId="urn:microsoft.com/office/officeart/2005/8/layout/hierarchy2"/>
     <dgm:cxn modelId="{35E6C8A8-765C-4C24-ABAE-B16C33814BF1}" type="presOf" srcId="{FA4799A0-A1A0-4F59-AD7B-E0EB6B8FFADF}" destId="{7A69C8F5-5B20-4243-82A0-432C2B1DD3A2}" srcOrd="0" destOrd="0" presId="urn:microsoft.com/office/officeart/2005/8/layout/hierarchy2"/>
     <dgm:cxn modelId="{CDB636B9-2075-4B9A-B2A1-A2133DBE767B}" srcId="{C13768ED-4F37-4E15-8378-5BFEF9486274}" destId="{614616D1-9AB0-4825-B4F0-E3B319A8A19C}" srcOrd="1" destOrd="0" parTransId="{08927EF9-BA2F-4AED-B168-41E724AB3C5B}" sibTransId="{55B2D39B-D971-47BD-BB1C-6CB90877CFF2}"/>
     <dgm:cxn modelId="{3F3FB2BF-076B-4DF9-8AE4-50B944BE4113}" srcId="{3C4A49FF-1CF0-458E-9BB0-7537638F50CB}" destId="{4F908973-2012-4DBF-94AD-2D00FD02D88A}" srcOrd="1" destOrd="0" parTransId="{185DEF35-D85D-43CD-837E-5BF53272E01D}" sibTransId="{ED55A296-A6FD-41AA-9E2D-92AE6FCC1C56}"/>
+    <dgm:cxn modelId="{B76D09C1-BB65-49B4-9E6E-21B9D0662154}" type="presOf" srcId="{E2D7F6EE-B8EA-4AC5-9F23-A58A00294E2D}" destId="{A7BD74AC-B185-4330-ACE4-F5A53E4B3F1C}" srcOrd="0" destOrd="0" presId="urn:microsoft.com/office/officeart/2005/8/layout/hierarchy2"/>
     <dgm:cxn modelId="{9BEDE3C7-9E75-4C89-8922-183A017AD521}" type="presOf" srcId="{607FCB25-8266-4E8C-BB25-F6190E2C5A51}" destId="{D6DCFFF0-C6DD-41F7-B3B4-9FD4BB929B39}" srcOrd="0" destOrd="0" presId="urn:microsoft.com/office/officeart/2005/8/layout/hierarchy2"/>
     <dgm:cxn modelId="{6EC616CE-603E-48BD-BB08-8327DF73DC6F}" type="presOf" srcId="{E7F01257-8479-40BF-8579-A2A2FF300C3A}" destId="{3739AAC3-4A73-4A02-925D-4BAAFBE98A63}" srcOrd="1" destOrd="0" presId="urn:microsoft.com/office/officeart/2005/8/layout/hierarchy2"/>
     <dgm:cxn modelId="{31EBAED2-ABD8-4C2C-8DAA-95E3825AEE76}" type="presOf" srcId="{C13768ED-4F37-4E15-8378-5BFEF9486274}" destId="{AE8F7343-D9EA-4FDB-8716-0D5BDCE3D032}" srcOrd="0" destOrd="0" presId="urn:microsoft.com/office/officeart/2005/8/layout/hierarchy2"/>
     <dgm:cxn modelId="{9F0B99D3-B66D-4612-A7BC-BB2A0EC4EA67}" type="presOf" srcId="{7462DDD1-F283-42DB-AB71-270FC8A6AF1F}" destId="{ECF396D5-4EE2-4530-9DB5-64486FFC7106}" srcOrd="0" destOrd="0" presId="urn:microsoft.com/office/officeart/2005/8/layout/hierarchy2"/>
     <dgm:cxn modelId="{524A00D4-78DE-47AE-AF0D-F60447447EED}" srcId="{C13768ED-4F37-4E15-8378-5BFEF9486274}" destId="{C24DF979-2D66-4345-A50F-2F65E68548CC}" srcOrd="0" destOrd="0" parTransId="{F6FF3177-E858-40BE-B66A-0AF1F75AA728}" sibTransId="{7913A6E9-A097-41CC-BA61-E27E9B469FAC}"/>
-    <dgm:cxn modelId="{727243D4-B079-419F-A83F-A9994986C37E}" srcId="{A243FECC-01F6-47EF-A427-18D141536F62}" destId="{0BC1B8F2-4F37-45C9-803C-8D0D7FF5FB7C}" srcOrd="0" destOrd="0" parTransId="{9343353A-BBEE-4C98-B9B8-5461F652185E}" sibTransId="{6D63B45A-FC4D-4D97-9646-1CB2E3183885}"/>
     <dgm:cxn modelId="{11DCC5DF-96B3-4B77-BD17-4EEED35B048C}" type="presOf" srcId="{185DEF35-D85D-43CD-837E-5BF53272E01D}" destId="{E14AF764-9B7C-4BE2-AC19-68A0E91B0E5E}" srcOrd="0" destOrd="0" presId="urn:microsoft.com/office/officeart/2005/8/layout/hierarchy2"/>
     <dgm:cxn modelId="{A7FE26E6-20C9-473B-A06F-7DC5B8A84ACB}" type="presOf" srcId="{11697691-F860-47DB-9C18-0ED146C2F1DC}" destId="{0FC40186-3AED-40D2-A110-151930D38A23}" srcOrd="0" destOrd="0" presId="urn:microsoft.com/office/officeart/2005/8/layout/hierarchy2"/>
     <dgm:cxn modelId="{2F1488ED-29DF-4C9A-9CFF-69BCF8139C08}" type="presOf" srcId="{16748D59-4592-47AE-975A-131BE08B71F4}" destId="{AD360AC5-34E4-4AB2-A09B-1029900D6680}" srcOrd="0" destOrd="0" presId="urn:microsoft.com/office/officeart/2005/8/layout/hierarchy2"/>
     <dgm:cxn modelId="{BDD7F3ED-2500-43AF-B6C2-4844C210DE99}" type="presOf" srcId="{A243FECC-01F6-47EF-A427-18D141536F62}" destId="{436EDD92-DA6A-4B27-B901-189C516DE422}" srcOrd="0" destOrd="0" presId="urn:microsoft.com/office/officeart/2005/8/layout/hierarchy2"/>
     <dgm:cxn modelId="{8DCB1AEF-82BB-4F2D-87B1-C3D12CD85BA1}" type="presOf" srcId="{F6FF3177-E858-40BE-B66A-0AF1F75AA728}" destId="{6CA05C5B-84A1-4281-9324-3D74E0F20D75}" srcOrd="1" destOrd="0" presId="urn:microsoft.com/office/officeart/2005/8/layout/hierarchy2"/>
-    <dgm:cxn modelId="{EF38E2FA-A22F-440B-97B9-3196FE5DCA20}" srcId="{35828132-24D6-4E8B-8159-362BEEDC9CEB}" destId="{B783E18C-2602-48BA-A831-683DB3893F2F}" srcOrd="0" destOrd="0" parTransId="{B3CB0421-242B-4A01-8C14-F8DCD3C16DD1}" sibTransId="{47A25A4B-FDCF-424A-B15D-FAB993BFDCF9}"/>
-    <dgm:cxn modelId="{5E4E96FE-CF69-4BBD-8C0F-017181C7B804}" type="presOf" srcId="{9343353A-BBEE-4C98-B9B8-5461F652185E}" destId="{CD6ABDF5-0442-4DC2-99ED-3AF1E712BD43}" srcOrd="1" destOrd="0" presId="urn:microsoft.com/office/officeart/2005/8/layout/hierarchy2"/>
+    <dgm:cxn modelId="{EBDBB9F8-9917-423F-A5E3-A6271B103220}" type="presOf" srcId="{2877F2C1-5503-4641-AB48-7F67E569974D}" destId="{C032E276-1115-4663-B80E-84F734612122}" srcOrd="1" destOrd="0" presId="urn:microsoft.com/office/officeart/2005/8/layout/hierarchy2"/>
     <dgm:cxn modelId="{135D5622-5304-4B2E-8053-EFD53001FDDE}" type="presParOf" srcId="{CCA956CC-2F0D-490E-8442-0D9607B1D492}" destId="{BE70D8C1-96CA-4AAD-81DE-C9C3962FF56E}" srcOrd="0" destOrd="0" presId="urn:microsoft.com/office/officeart/2005/8/layout/hierarchy2"/>
     <dgm:cxn modelId="{101B3F04-C953-47E6-B4D6-E094EF0804BD}" type="presParOf" srcId="{BE70D8C1-96CA-4AAD-81DE-C9C3962FF56E}" destId="{8CBF702C-68F8-444E-B80E-D98D6DC80C16}" srcOrd="0" destOrd="0" presId="urn:microsoft.com/office/officeart/2005/8/layout/hierarchy2"/>
     <dgm:cxn modelId="{DD63A654-9A46-4C9D-8441-54158DE7E6C2}" type="presParOf" srcId="{BE70D8C1-96CA-4AAD-81DE-C9C3962FF56E}" destId="{D7372705-2EBA-4EAC-AF77-5423ADA4C3A8}" srcOrd="1" destOrd="0" presId="urn:microsoft.com/office/officeart/2005/8/layout/hierarchy2"/>
@@ -2904,14 +2817,9 @@
     <dgm:cxn modelId="{7458E86D-1589-4D4D-8E09-F2489AAE30CC}" type="presParOf" srcId="{5CB32101-EDC5-4E1F-8BD9-637F06E29EF6}" destId="{40685F52-4177-401F-ADA0-87AC4EABD88D}" srcOrd="1" destOrd="0" presId="urn:microsoft.com/office/officeart/2005/8/layout/hierarchy2"/>
     <dgm:cxn modelId="{9F07465E-6F84-41E1-80F0-791C48DF1F3C}" type="presParOf" srcId="{40685F52-4177-401F-ADA0-87AC4EABD88D}" destId="{77403EC1-8879-4879-957E-C6EABCFA5DA0}" srcOrd="0" destOrd="0" presId="urn:microsoft.com/office/officeart/2005/8/layout/hierarchy2"/>
     <dgm:cxn modelId="{BB5775D4-7E18-483E-9DE6-90AEC699F704}" type="presParOf" srcId="{40685F52-4177-401F-ADA0-87AC4EABD88D}" destId="{9D52B784-492D-4975-8E77-CFFC96A27D2A}" srcOrd="1" destOrd="0" presId="urn:microsoft.com/office/officeart/2005/8/layout/hierarchy2"/>
-    <dgm:cxn modelId="{E344294B-AC26-412E-8587-D2D93DA91684}" type="presParOf" srcId="{9D52B784-492D-4975-8E77-CFFC96A27D2A}" destId="{4E636E47-392C-4DC5-BAEB-CDAC3C583442}" srcOrd="0" destOrd="0" presId="urn:microsoft.com/office/officeart/2005/8/layout/hierarchy2"/>
-    <dgm:cxn modelId="{E2A92955-6E0C-4BB1-9B9E-1BA6CC0CE70E}" type="presParOf" srcId="{4E636E47-392C-4DC5-BAEB-CDAC3C583442}" destId="{6038CCFE-4A40-460F-A760-753FB678D58E}" srcOrd="0" destOrd="0" presId="urn:microsoft.com/office/officeart/2005/8/layout/hierarchy2"/>
-    <dgm:cxn modelId="{B2B2EBA5-CA39-422C-B474-1C695ED62834}" type="presParOf" srcId="{9D52B784-492D-4975-8E77-CFFC96A27D2A}" destId="{58C6D933-0693-4264-920C-78634A24901B}" srcOrd="1" destOrd="0" presId="urn:microsoft.com/office/officeart/2005/8/layout/hierarchy2"/>
-    <dgm:cxn modelId="{E3F3EA79-377F-45BA-93CC-F8F19D78D4E2}" type="presParOf" srcId="{58C6D933-0693-4264-920C-78634A24901B}" destId="{38831AE3-CCD9-4520-8F76-E5803B5AEB04}" srcOrd="0" destOrd="0" presId="urn:microsoft.com/office/officeart/2005/8/layout/hierarchy2"/>
-    <dgm:cxn modelId="{30DD582A-404E-4474-B85D-AE1FEAE98A2A}" type="presParOf" srcId="{58C6D933-0693-4264-920C-78634A24901B}" destId="{2A2801A0-1B00-4858-B797-5FF72E1967FE}" srcOrd="1" destOrd="0" presId="urn:microsoft.com/office/officeart/2005/8/layout/hierarchy2"/>
-    <dgm:cxn modelId="{12B870B9-46CF-4720-A917-DF61C6A5ED75}" type="presParOf" srcId="{9D52B784-492D-4975-8E77-CFFC96A27D2A}" destId="{AD360AC5-34E4-4AB2-A09B-1029900D6680}" srcOrd="2" destOrd="0" presId="urn:microsoft.com/office/officeart/2005/8/layout/hierarchy2"/>
+    <dgm:cxn modelId="{12B870B9-46CF-4720-A917-DF61C6A5ED75}" type="presParOf" srcId="{9D52B784-492D-4975-8E77-CFFC96A27D2A}" destId="{AD360AC5-34E4-4AB2-A09B-1029900D6680}" srcOrd="0" destOrd="0" presId="urn:microsoft.com/office/officeart/2005/8/layout/hierarchy2"/>
     <dgm:cxn modelId="{5A49D12C-57D1-472A-9CA8-1C4756ED2CDC}" type="presParOf" srcId="{AD360AC5-34E4-4AB2-A09B-1029900D6680}" destId="{0B087112-D4C1-482F-BF6D-043E25641859}" srcOrd="0" destOrd="0" presId="urn:microsoft.com/office/officeart/2005/8/layout/hierarchy2"/>
-    <dgm:cxn modelId="{1DB09390-D69E-4084-BD23-3B132DBA1C8E}" type="presParOf" srcId="{9D52B784-492D-4975-8E77-CFFC96A27D2A}" destId="{FF406E84-E8BE-453B-9B9F-E22F6CD2E3CB}" srcOrd="3" destOrd="0" presId="urn:microsoft.com/office/officeart/2005/8/layout/hierarchy2"/>
+    <dgm:cxn modelId="{1DB09390-D69E-4084-BD23-3B132DBA1C8E}" type="presParOf" srcId="{9D52B784-492D-4975-8E77-CFFC96A27D2A}" destId="{FF406E84-E8BE-453B-9B9F-E22F6CD2E3CB}" srcOrd="1" destOrd="0" presId="urn:microsoft.com/office/officeart/2005/8/layout/hierarchy2"/>
     <dgm:cxn modelId="{3659C392-AC60-459B-860E-0D95F3BC111B}" type="presParOf" srcId="{FF406E84-E8BE-453B-9B9F-E22F6CD2E3CB}" destId="{7A69C8F5-5B20-4243-82A0-432C2B1DD3A2}" srcOrd="0" destOrd="0" presId="urn:microsoft.com/office/officeart/2005/8/layout/hierarchy2"/>
     <dgm:cxn modelId="{0F906A2A-FFB3-4BA0-A2AF-9A995958580F}" type="presParOf" srcId="{FF406E84-E8BE-453B-9B9F-E22F6CD2E3CB}" destId="{F08D7682-E9B4-492D-8D65-3C8EFA8455C4}" srcOrd="1" destOrd="0" presId="urn:microsoft.com/office/officeart/2005/8/layout/hierarchy2"/>
     <dgm:cxn modelId="{15678B60-BAAE-4626-801A-A00819332332}" type="presParOf" srcId="{F08D7682-E9B4-492D-8D65-3C8EFA8455C4}" destId="{A2965524-5BE6-4805-A284-EBDF70C80049}" srcOrd="0" destOrd="0" presId="urn:microsoft.com/office/officeart/2005/8/layout/hierarchy2"/>
@@ -2929,11 +2837,11 @@
     <dgm:cxn modelId="{4D607C46-5803-44A4-ACF0-DBCA641AED70}" type="presParOf" srcId="{5CB32101-EDC5-4E1F-8BD9-637F06E29EF6}" destId="{1C1D9F12-4019-42E5-9FA9-B99C9AEE8EF3}" srcOrd="3" destOrd="0" presId="urn:microsoft.com/office/officeart/2005/8/layout/hierarchy2"/>
     <dgm:cxn modelId="{ABB0B2A2-E96E-425E-997F-0865F8BFDF0C}" type="presParOf" srcId="{1C1D9F12-4019-42E5-9FA9-B99C9AEE8EF3}" destId="{436EDD92-DA6A-4B27-B901-189C516DE422}" srcOrd="0" destOrd="0" presId="urn:microsoft.com/office/officeart/2005/8/layout/hierarchy2"/>
     <dgm:cxn modelId="{CA47BCE6-ED82-481C-971A-C1536F4022B1}" type="presParOf" srcId="{1C1D9F12-4019-42E5-9FA9-B99C9AEE8EF3}" destId="{41282A31-3DA5-4447-A325-0D0ACBEB8D43}" srcOrd="1" destOrd="0" presId="urn:microsoft.com/office/officeart/2005/8/layout/hierarchy2"/>
-    <dgm:cxn modelId="{ABFEFF4B-F245-4178-82A3-FAB20CF36F5C}" type="presParOf" srcId="{41282A31-3DA5-4447-A325-0D0ACBEB8D43}" destId="{AE383538-6B8D-480B-B140-11130A077716}" srcOrd="0" destOrd="0" presId="urn:microsoft.com/office/officeart/2005/8/layout/hierarchy2"/>
-    <dgm:cxn modelId="{F785C400-7FAC-4080-BF4D-BE37567D86C8}" type="presParOf" srcId="{AE383538-6B8D-480B-B140-11130A077716}" destId="{CD6ABDF5-0442-4DC2-99ED-3AF1E712BD43}" srcOrd="0" destOrd="0" presId="urn:microsoft.com/office/officeart/2005/8/layout/hierarchy2"/>
-    <dgm:cxn modelId="{94B612B9-EAD2-4576-A5B1-4045F3A735CA}" type="presParOf" srcId="{41282A31-3DA5-4447-A325-0D0ACBEB8D43}" destId="{082A36FC-A602-42B9-A3AF-B865342C6AE1}" srcOrd="1" destOrd="0" presId="urn:microsoft.com/office/officeart/2005/8/layout/hierarchy2"/>
-    <dgm:cxn modelId="{762F855E-17E8-4267-98C2-1745F3A7B427}" type="presParOf" srcId="{082A36FC-A602-42B9-A3AF-B865342C6AE1}" destId="{F64A791C-00A4-432F-9090-52BCD216B8B8}" srcOrd="0" destOrd="0" presId="urn:microsoft.com/office/officeart/2005/8/layout/hierarchy2"/>
-    <dgm:cxn modelId="{644E17C3-C387-4EB2-932D-1488AFF81842}" type="presParOf" srcId="{082A36FC-A602-42B9-A3AF-B865342C6AE1}" destId="{48F38923-B6AA-4A68-8B56-F0FA9AC4936D}" srcOrd="1" destOrd="0" presId="urn:microsoft.com/office/officeart/2005/8/layout/hierarchy2"/>
+    <dgm:cxn modelId="{D0979434-DDB8-4297-BC74-F64981A7EEF0}" type="presParOf" srcId="{5CB32101-EDC5-4E1F-8BD9-637F06E29EF6}" destId="{6916750A-C3C3-4973-BA63-D0DC2D57C12A}" srcOrd="4" destOrd="0" presId="urn:microsoft.com/office/officeart/2005/8/layout/hierarchy2"/>
+    <dgm:cxn modelId="{21878B9C-DF23-4A30-AAE7-075AD28FDE2F}" type="presParOf" srcId="{6916750A-C3C3-4973-BA63-D0DC2D57C12A}" destId="{C032E276-1115-4663-B80E-84F734612122}" srcOrd="0" destOrd="0" presId="urn:microsoft.com/office/officeart/2005/8/layout/hierarchy2"/>
+    <dgm:cxn modelId="{BD367028-C7A3-48E1-9BA6-E9B42B56ACC1}" type="presParOf" srcId="{5CB32101-EDC5-4E1F-8BD9-637F06E29EF6}" destId="{97B1AB52-3912-4F0E-BF40-872DE3854C10}" srcOrd="5" destOrd="0" presId="urn:microsoft.com/office/officeart/2005/8/layout/hierarchy2"/>
+    <dgm:cxn modelId="{4B25CA4B-C165-4739-840D-8C667BDF9EC9}" type="presParOf" srcId="{97B1AB52-3912-4F0E-BF40-872DE3854C10}" destId="{A7BD74AC-B185-4330-ACE4-F5A53E4B3F1C}" srcOrd="0" destOrd="0" presId="urn:microsoft.com/office/officeart/2005/8/layout/hierarchy2"/>
+    <dgm:cxn modelId="{54F66D7F-4E21-4C56-899F-C6604DC17D92}" type="presParOf" srcId="{97B1AB52-3912-4F0E-BF40-872DE3854C10}" destId="{1CE3DD6E-57E2-4464-B3F2-A49B35D248FC}" srcOrd="1" destOrd="0" presId="urn:microsoft.com/office/officeart/2005/8/layout/hierarchy2"/>
     <dgm:cxn modelId="{C1FEA66F-1C1B-4AD3-9D91-2B35C1C16D45}" type="presParOf" srcId="{E223B0EF-49EA-471C-93F5-6848889E3CBA}" destId="{47516D7C-106F-4664-A550-6DAB42875566}" srcOrd="2" destOrd="0" presId="urn:microsoft.com/office/officeart/2005/8/layout/hierarchy2"/>
     <dgm:cxn modelId="{8FFA5167-8480-4ACB-8ACB-13A6A63DDDA6}" type="presParOf" srcId="{47516D7C-106F-4664-A550-6DAB42875566}" destId="{19E51B11-34C1-4922-99E3-02A46FF61989}" srcOrd="0" destOrd="0" presId="urn:microsoft.com/office/officeart/2005/8/layout/hierarchy2"/>
     <dgm:cxn modelId="{92C561D6-4653-4641-B5B0-B9D1F4997477}" type="presParOf" srcId="{E223B0EF-49EA-471C-93F5-6848889E3CBA}" destId="{86FB53C1-780C-4AF9-A88A-C081B6923A5E}" srcOrd="3" destOrd="0" presId="urn:microsoft.com/office/officeart/2005/8/layout/hierarchy2"/>
@@ -4180,8 +4088,8 @@
       </dsp:nvSpPr>
       <dsp:spPr>
         <a:xfrm>
-          <a:off x="6212" y="3593635"/>
-          <a:ext cx="1347145" cy="1375293"/>
+          <a:off x="15022" y="3072141"/>
+          <a:ext cx="1347145" cy="1477865"/>
         </a:xfrm>
         <a:prstGeom prst="roundRect">
           <a:avLst>
@@ -4238,7 +4146,7 @@
             <a:buNone/>
           </a:pPr>
           <a:r>
-            <a:rPr lang="en-US" sz="1800" kern="1200" dirty="0">
+            <a:rPr lang="en-US" sz="1800" kern="1200">
               <a:solidFill>
                 <a:schemeClr val="tx1"/>
               </a:solidFill>
@@ -4260,7 +4168,7 @@
             <a:buNone/>
           </a:pPr>
           <a:r>
-            <a:rPr lang="en-US" sz="1800" kern="1200" dirty="0">
+            <a:rPr lang="en-US" sz="1800" kern="1200">
               <a:solidFill>
                 <a:schemeClr val="tx1"/>
               </a:solidFill>
@@ -4275,8 +4183,8 @@
         </a:p>
       </dsp:txBody>
       <dsp:txXfrm>
-        <a:off x="45669" y="3633092"/>
-        <a:ext cx="1268231" cy="1296379"/>
+        <a:off x="54479" y="3111598"/>
+        <a:ext cx="1268231" cy="1398951"/>
       </dsp:txXfrm>
     </dsp:sp>
     <dsp:sp modelId="{A0373647-8495-4AD7-9232-CCECAE989C18}">
@@ -4285,9 +4193,9 @@
         <dsp:cNvSpPr/>
       </dsp:nvSpPr>
       <dsp:spPr>
-        <a:xfrm rot="17219055">
-          <a:off x="1056323" y="3870343"/>
-          <a:ext cx="839207" cy="19273"/>
+        <a:xfrm rot="18209244">
+          <a:off x="1266170" y="3622824"/>
+          <a:ext cx="428324" cy="19273"/>
         </a:xfrm>
         <a:custGeom>
           <a:avLst/>
@@ -4301,7 +4209,7 @@
                 <a:pt x="0" y="9636"/>
               </a:moveTo>
               <a:lnTo>
-                <a:pt x="839207" y="9636"/>
+                <a:pt x="428324" y="9636"/>
               </a:lnTo>
             </a:path>
           </a:pathLst>
@@ -4350,8 +4258,8 @@
         </a:p>
       </dsp:txBody>
       <dsp:txXfrm>
-        <a:off x="1454947" y="3858999"/>
-        <a:ext cx="41960" cy="41960"/>
+        <a:off x="1469624" y="3621753"/>
+        <a:ext cx="21416" cy="21416"/>
       </dsp:txXfrm>
     </dsp:sp>
     <dsp:sp modelId="{AE8F7343-D9EA-4FDB-8716-0D5BDCE3D032}">
@@ -4361,7 +4269,7 @@
       </dsp:nvSpPr>
       <dsp:spPr>
         <a:xfrm>
-          <a:off x="1598497" y="2966664"/>
+          <a:off x="1598497" y="2941835"/>
           <a:ext cx="1347145" cy="1024025"/>
         </a:xfrm>
         <a:prstGeom prst="roundRect">
@@ -4419,7 +4327,7 @@
             <a:buNone/>
           </a:pPr>
           <a:r>
-            <a:rPr lang="en-US" sz="1800" kern="1200" dirty="0">
+            <a:rPr lang="en-US" sz="1800" kern="1200">
               <a:solidFill>
                 <a:schemeClr val="tx1"/>
               </a:solidFill>
@@ -4441,7 +4349,7 @@
             <a:buNone/>
           </a:pPr>
           <a:r>
-            <a:rPr lang="en-US" sz="1800" kern="1200" dirty="0">
+            <a:rPr lang="en-US" sz="1800" kern="1200">
               <a:solidFill>
                 <a:schemeClr val="tx1"/>
               </a:solidFill>
@@ -4456,7 +4364,7 @@
         </a:p>
       </dsp:txBody>
       <dsp:txXfrm>
-        <a:off x="1628490" y="2996657"/>
+        <a:off x="1628490" y="2971828"/>
         <a:ext cx="1287159" cy="964039"/>
       </dsp:txXfrm>
     </dsp:sp>
@@ -4466,9 +4374,9 @@
         <dsp:cNvSpPr/>
       </dsp:nvSpPr>
       <dsp:spPr>
-        <a:xfrm rot="2275290">
-          <a:off x="2897209" y="3610014"/>
-          <a:ext cx="458763" cy="19273"/>
+        <a:xfrm rot="2309229">
+          <a:off x="2895420" y="3588078"/>
+          <a:ext cx="462341" cy="19273"/>
         </a:xfrm>
         <a:custGeom>
           <a:avLst/>
@@ -4482,7 +4390,7 @@
                 <a:pt x="0" y="9636"/>
               </a:moveTo>
               <a:lnTo>
-                <a:pt x="458763" y="9636"/>
+                <a:pt x="462341" y="9636"/>
               </a:lnTo>
             </a:path>
           </a:pathLst>
@@ -4531,8 +4439,8 @@
         </a:p>
       </dsp:txBody>
       <dsp:txXfrm>
-        <a:off x="3115122" y="3608181"/>
-        <a:ext cx="22938" cy="22938"/>
+        <a:off x="3115032" y="3586156"/>
+        <a:ext cx="23117" cy="23117"/>
       </dsp:txXfrm>
     </dsp:sp>
     <dsp:sp modelId="{732BC4D0-8891-4A3E-8D6D-EF424F42FC82}">
@@ -4542,7 +4450,7 @@
       </dsp:nvSpPr>
       <dsp:spPr>
         <a:xfrm>
-          <a:off x="3307539" y="3423838"/>
+          <a:off x="3307539" y="3404795"/>
           <a:ext cx="1347145" cy="673572"/>
         </a:xfrm>
         <a:prstGeom prst="roundRect">
@@ -4600,7 +4508,7 @@
             <a:buNone/>
           </a:pPr>
           <a:r>
-            <a:rPr lang="en-US" sz="1800" kern="1200" dirty="0">
+            <a:rPr lang="en-US" sz="1800" kern="1200">
               <a:solidFill>
                 <a:schemeClr val="tx1"/>
               </a:solidFill>
@@ -4622,7 +4530,7 @@
             <a:buNone/>
           </a:pPr>
           <a:r>
-            <a:rPr lang="en-US" sz="1800" kern="1200" dirty="0">
+            <a:rPr lang="en-US" sz="1800" kern="1200">
               <a:solidFill>
                 <a:schemeClr val="tx1"/>
               </a:solidFill>
@@ -4637,7 +4545,7 @@
         </a:p>
       </dsp:txBody>
       <dsp:txXfrm>
-        <a:off x="3327267" y="3443566"/>
+        <a:off x="3327267" y="3424523"/>
         <a:ext cx="1307689" cy="634116"/>
       </dsp:txXfrm>
     </dsp:sp>
@@ -4647,9 +4555,9 @@
         <dsp:cNvSpPr/>
       </dsp:nvSpPr>
       <dsp:spPr>
-        <a:xfrm rot="18148843">
-          <a:off x="4493251" y="3456851"/>
-          <a:ext cx="697359" cy="19273"/>
+        <a:xfrm rot="17294710">
+          <a:off x="4243859" y="3163941"/>
+          <a:ext cx="1196142" cy="19273"/>
         </a:xfrm>
         <a:custGeom>
           <a:avLst/>
@@ -4663,7 +4571,7 @@
                 <a:pt x="0" y="9636"/>
               </a:moveTo>
               <a:lnTo>
-                <a:pt x="697359" y="9636"/>
+                <a:pt x="1196142" y="9636"/>
               </a:lnTo>
             </a:path>
           </a:pathLst>
@@ -4712,8 +4620,8 @@
         </a:p>
       </dsp:txBody>
       <dsp:txXfrm>
-        <a:off x="4824497" y="3449053"/>
-        <a:ext cx="34867" cy="34867"/>
+        <a:off x="4812027" y="3143674"/>
+        <a:ext cx="59807" cy="59807"/>
       </dsp:txXfrm>
     </dsp:sp>
     <dsp:sp modelId="{77403EC1-8879-4879-957E-C6EABCFA5DA0}">
@@ -4723,8 +4631,8 @@
       </dsp:nvSpPr>
       <dsp:spPr>
         <a:xfrm>
-          <a:off x="5029177" y="2657341"/>
-          <a:ext cx="1347145" cy="1030020"/>
+          <a:off x="5029177" y="2139007"/>
+          <a:ext cx="1347145" cy="933133"/>
         </a:xfrm>
         <a:prstGeom prst="roundRect">
           <a:avLst>
@@ -4808,7 +4716,7 @@
                 <a:schemeClr val="tx1"/>
               </a:solidFill>
             </a:rPr>
-            <a:t>N = 40</a:t>
+            <a:t>N = 37</a:t>
           </a:r>
           <a:endParaRPr lang="nl-NL" sz="1800" kern="1200" dirty="0">
             <a:solidFill>
@@ -4818,19 +4726,19 @@
         </a:p>
       </dsp:txBody>
       <dsp:txXfrm>
-        <a:off x="5059345" y="2687509"/>
-        <a:ext cx="1286809" cy="969684"/>
+        <a:off x="5056508" y="2166338"/>
+        <a:ext cx="1292483" cy="878471"/>
       </dsp:txXfrm>
     </dsp:sp>
-    <dsp:sp modelId="{4E636E47-392C-4DC5-BAEB-CDAC3C583442}">
+    <dsp:sp modelId="{AD360AC5-34E4-4AB2-A09B-1029900D6680}">
       <dsp:nvSpPr>
         <dsp:cNvPr id="0" name=""/>
         <dsp:cNvSpPr/>
       </dsp:nvSpPr>
       <dsp:spPr>
-        <a:xfrm rot="17406293">
-          <a:off x="6125430" y="2803704"/>
-          <a:ext cx="764613" cy="19273"/>
+        <a:xfrm rot="4650312">
+          <a:off x="5896007" y="3194343"/>
+          <a:ext cx="1225843" cy="19273"/>
         </a:xfrm>
         <a:custGeom>
           <a:avLst/>
@@ -4844,7 +4752,7 @@
                 <a:pt x="0" y="9636"/>
               </a:moveTo>
               <a:lnTo>
-                <a:pt x="764613" y="9636"/>
+                <a:pt x="1225843" y="9636"/>
               </a:lnTo>
             </a:path>
           </a:pathLst>
@@ -4893,19 +4801,19 @@
         </a:p>
       </dsp:txBody>
       <dsp:txXfrm>
-        <a:off x="6488621" y="2794225"/>
-        <a:ext cx="38230" cy="38230"/>
+        <a:off x="6478282" y="3173333"/>
+        <a:ext cx="61292" cy="61292"/>
       </dsp:txXfrm>
     </dsp:sp>
-    <dsp:sp modelId="{38831AE3-CCD9-4520-8F76-E5803B5AEB04}">
+    <dsp:sp modelId="{7A69C8F5-5B20-4243-82A0-432C2B1DD3A2}">
       <dsp:nvSpPr>
         <dsp:cNvPr id="0" name=""/>
         <dsp:cNvSpPr/>
       </dsp:nvSpPr>
       <dsp:spPr>
         <a:xfrm>
-          <a:off x="6639150" y="1984711"/>
-          <a:ext cx="1347145" cy="939236"/>
+          <a:off x="6641535" y="3068935"/>
+          <a:ext cx="1347145" cy="1466899"/>
         </a:xfrm>
         <a:prstGeom prst="roundRect">
           <a:avLst>
@@ -4967,7 +4875,7 @@
                 <a:schemeClr val="tx1"/>
               </a:solidFill>
             </a:rPr>
-            <a:t>Other Languages</a:t>
+            <a:t>Data and Code Available </a:t>
           </a:r>
         </a:p>
         <a:p>
@@ -4989,7 +4897,7 @@
                 <a:schemeClr val="tx1"/>
               </a:solidFill>
             </a:rPr>
-            <a:t>N = 5</a:t>
+            <a:t>N = 35</a:t>
           </a:r>
           <a:endParaRPr lang="nl-NL" sz="1800" kern="1200" dirty="0">
             <a:solidFill>
@@ -4999,19 +4907,19 @@
         </a:p>
       </dsp:txBody>
       <dsp:txXfrm>
-        <a:off x="6666659" y="2012220"/>
-        <a:ext cx="1292127" cy="884218"/>
+        <a:off x="6680992" y="3108392"/>
+        <a:ext cx="1268231" cy="1387985"/>
       </dsp:txXfrm>
     </dsp:sp>
-    <dsp:sp modelId="{AD360AC5-34E4-4AB2-A09B-1029900D6680}">
+    <dsp:sp modelId="{A2965524-5BE6-4805-A284-EBDF70C80049}">
       <dsp:nvSpPr>
         <dsp:cNvPr id="0" name=""/>
         <dsp:cNvSpPr/>
       </dsp:nvSpPr>
       <dsp:spPr>
-        <a:xfrm rot="3714588">
-          <a:off x="6228477" y="3409210"/>
-          <a:ext cx="558815" cy="19273"/>
+        <a:xfrm rot="43610">
+          <a:off x="7988670" y="3794250"/>
+          <a:ext cx="236820" cy="19273"/>
         </a:xfrm>
         <a:custGeom>
           <a:avLst/>
@@ -5025,7 +4933,7 @@
                 <a:pt x="0" y="9636"/>
               </a:moveTo>
               <a:lnTo>
-                <a:pt x="558815" y="9636"/>
+                <a:pt x="236820" y="9636"/>
               </a:lnTo>
             </a:path>
           </a:pathLst>
@@ -5074,189 +4982,8 @@
         </a:p>
       </dsp:txBody>
       <dsp:txXfrm>
-        <a:off x="6493914" y="3404876"/>
-        <a:ext cx="27940" cy="27940"/>
-      </dsp:txXfrm>
-    </dsp:sp>
-    <dsp:sp modelId="{7A69C8F5-5B20-4243-82A0-432C2B1DD3A2}">
-      <dsp:nvSpPr>
-        <dsp:cNvPr id="0" name=""/>
-        <dsp:cNvSpPr/>
-      </dsp:nvSpPr>
-      <dsp:spPr>
-        <a:xfrm>
-          <a:off x="6639447" y="3181488"/>
-          <a:ext cx="1347145" cy="967708"/>
-        </a:xfrm>
-        <a:prstGeom prst="roundRect">
-          <a:avLst>
-            <a:gd name="adj" fmla="val 10000"/>
-          </a:avLst>
-        </a:prstGeom>
-        <a:solidFill>
-          <a:schemeClr val="lt1">
-            <a:hueOff val="0"/>
-            <a:satOff val="0"/>
-            <a:lumOff val="0"/>
-            <a:alphaOff val="0"/>
-          </a:schemeClr>
-        </a:solidFill>
-        <a:ln w="28575" cap="flat" cmpd="sng" algn="ctr">
-          <a:solidFill>
-            <a:scrgbClr r="0" g="0" b="0"/>
-          </a:solidFill>
-          <a:prstDash val="solid"/>
-          <a:miter lim="800000"/>
-        </a:ln>
-        <a:effectLst/>
-      </dsp:spPr>
-      <dsp:style>
-        <a:lnRef idx="3">
-          <a:scrgbClr r="0" g="0" b="0"/>
-        </a:lnRef>
-        <a:fillRef idx="1">
-          <a:scrgbClr r="0" g="0" b="0"/>
-        </a:fillRef>
-        <a:effectRef idx="1">
-          <a:scrgbClr r="0" g="0" b="0"/>
-        </a:effectRef>
-        <a:fontRef idx="minor">
-          <a:schemeClr val="lt1"/>
-        </a:fontRef>
-      </dsp:style>
-      <dsp:txBody>
-        <a:bodyPr spcFirstLastPara="0" vert="horz" wrap="square" lIns="11430" tIns="11430" rIns="11430" bIns="11430" numCol="1" spcCol="1270" anchor="ctr" anchorCtr="0">
-          <a:noAutofit/>
-        </a:bodyPr>
-        <a:lstStyle/>
-        <a:p>
-          <a:pPr marL="0" lvl="0" indent="0" algn="ctr" defTabSz="800100">
-            <a:lnSpc>
-              <a:spcPct val="90000"/>
-            </a:lnSpc>
-            <a:spcBef>
-              <a:spcPct val="0"/>
-            </a:spcBef>
-            <a:spcAft>
-              <a:spcPct val="35000"/>
-            </a:spcAft>
-            <a:buNone/>
-          </a:pPr>
-          <a:r>
-            <a:rPr lang="en-US" sz="1800" kern="1200" dirty="0">
-              <a:solidFill>
-                <a:schemeClr val="tx1"/>
-              </a:solidFill>
-            </a:rPr>
-            <a:t>R, SPSS, or JASP</a:t>
-          </a:r>
-        </a:p>
-        <a:p>
-          <a:pPr marL="0" lvl="0" indent="0" algn="ctr" defTabSz="800100">
-            <a:lnSpc>
-              <a:spcPct val="90000"/>
-            </a:lnSpc>
-            <a:spcBef>
-              <a:spcPct val="0"/>
-            </a:spcBef>
-            <a:spcAft>
-              <a:spcPct val="35000"/>
-            </a:spcAft>
-            <a:buNone/>
-          </a:pPr>
-          <a:r>
-            <a:rPr lang="en-US" sz="1800" kern="1200" dirty="0">
-              <a:solidFill>
-                <a:schemeClr val="tx1"/>
-              </a:solidFill>
-            </a:rPr>
-            <a:t>N = 35</a:t>
-          </a:r>
-          <a:endParaRPr lang="nl-NL" sz="1800" kern="1200" dirty="0">
-            <a:solidFill>
-              <a:schemeClr val="tx1"/>
-            </a:solidFill>
-          </a:endParaRPr>
-        </a:p>
-      </dsp:txBody>
-      <dsp:txXfrm>
-        <a:off x="6667790" y="3209831"/>
-        <a:ext cx="1290459" cy="911022"/>
-      </dsp:txXfrm>
-    </dsp:sp>
-    <dsp:sp modelId="{A2965524-5BE6-4805-A284-EBDF70C80049}">
-      <dsp:nvSpPr>
-        <dsp:cNvPr id="0" name=""/>
-        <dsp:cNvSpPr/>
-      </dsp:nvSpPr>
-      <dsp:spPr>
-        <a:xfrm rot="21570308">
-          <a:off x="7986586" y="3654399"/>
-          <a:ext cx="302593" cy="19273"/>
-        </a:xfrm>
-        <a:custGeom>
-          <a:avLst/>
-          <a:gdLst/>
-          <a:ahLst/>
-          <a:cxnLst/>
-          <a:rect l="0" t="0" r="0" b="0"/>
-          <a:pathLst>
-            <a:path>
-              <a:moveTo>
-                <a:pt x="0" y="9636"/>
-              </a:moveTo>
-              <a:lnTo>
-                <a:pt x="302593" y="9636"/>
-              </a:lnTo>
-            </a:path>
-          </a:pathLst>
-        </a:custGeom>
-        <a:noFill/>
-        <a:ln w="28575" cap="flat" cmpd="sng" algn="ctr">
-          <a:solidFill>
-            <a:scrgbClr r="0" g="0" b="0"/>
-          </a:solidFill>
-          <a:prstDash val="solid"/>
-          <a:miter lim="800000"/>
-        </a:ln>
-        <a:effectLst/>
-      </dsp:spPr>
-      <dsp:style>
-        <a:lnRef idx="2">
-          <a:scrgbClr r="0" g="0" b="0"/>
-        </a:lnRef>
-        <a:fillRef idx="0">
-          <a:scrgbClr r="0" g="0" b="0"/>
-        </a:fillRef>
-        <a:effectRef idx="0">
-          <a:scrgbClr r="0" g="0" b="0"/>
-        </a:effectRef>
-        <a:fontRef idx="minor"/>
-      </dsp:style>
-      <dsp:txBody>
-        <a:bodyPr spcFirstLastPara="0" vert="horz" wrap="square" lIns="12700" tIns="0" rIns="12700" bIns="0" numCol="1" spcCol="1270" anchor="ctr" anchorCtr="0">
-          <a:noAutofit/>
-        </a:bodyPr>
-        <a:lstStyle/>
-        <a:p>
-          <a:pPr marL="0" lvl="0" indent="0" algn="ctr" defTabSz="222250">
-            <a:lnSpc>
-              <a:spcPct val="90000"/>
-            </a:lnSpc>
-            <a:spcBef>
-              <a:spcPct val="0"/>
-            </a:spcBef>
-            <a:spcAft>
-              <a:spcPct val="35000"/>
-            </a:spcAft>
-            <a:buNone/>
-          </a:pPr>
-          <a:endParaRPr lang="nl-NL" sz="500" kern="1200"/>
-        </a:p>
-      </dsp:txBody>
-      <dsp:txXfrm>
-        <a:off x="8130318" y="3656471"/>
-        <a:ext cx="15129" cy="15129"/>
+        <a:off x="8101160" y="3797966"/>
+        <a:ext cx="11841" cy="11841"/>
       </dsp:txXfrm>
     </dsp:sp>
     <dsp:sp modelId="{D6DCFFF0-C6DD-41F7-B3B4-9FD4BB929B39}">
@@ -5266,7 +4993,7 @@
       </dsp:nvSpPr>
       <dsp:spPr>
         <a:xfrm>
-          <a:off x="8289174" y="3325942"/>
+          <a:off x="8225481" y="3468602"/>
           <a:ext cx="1347145" cy="673572"/>
         </a:xfrm>
         <a:prstGeom prst="roundRect">
@@ -5351,7 +5078,7 @@
                 <a:schemeClr val="tx1"/>
               </a:solidFill>
             </a:rPr>
-            <a:t>N = 30</a:t>
+            <a:t>N = 31</a:t>
           </a:r>
           <a:endParaRPr lang="nl-NL" sz="1800" kern="1200" dirty="0">
             <a:solidFill>
@@ -5361,7 +5088,7 @@
         </a:p>
       </dsp:txBody>
       <dsp:txXfrm>
-        <a:off x="8308902" y="3345670"/>
+        <a:off x="8245209" y="3488330"/>
         <a:ext cx="1307689" cy="634116"/>
       </dsp:txXfrm>
     </dsp:sp>
@@ -5371,9 +5098,9 @@
         <dsp:cNvSpPr/>
       </dsp:nvSpPr>
       <dsp:spPr>
-        <a:xfrm rot="21535334">
-          <a:off x="9636293" y="3650317"/>
-          <a:ext cx="295076" cy="19273"/>
+        <a:xfrm rot="21572699">
+          <a:off x="9572623" y="3794856"/>
+          <a:ext cx="225613" cy="19273"/>
         </a:xfrm>
         <a:custGeom>
           <a:avLst/>
@@ -5387,7 +5114,7 @@
                 <a:pt x="0" y="9636"/>
               </a:moveTo>
               <a:lnTo>
-                <a:pt x="295076" y="9636"/>
+                <a:pt x="225613" y="9636"/>
               </a:lnTo>
             </a:path>
           </a:pathLst>
@@ -5436,8 +5163,8 @@
         </a:p>
       </dsp:txBody>
       <dsp:txXfrm>
-        <a:off x="9776455" y="3652577"/>
-        <a:ext cx="14753" cy="14753"/>
+        <a:off x="9679789" y="3798853"/>
+        <a:ext cx="11280" cy="11280"/>
       </dsp:txXfrm>
     </dsp:sp>
     <dsp:sp modelId="{064C1D77-3277-489D-9811-9D89200A3D1D}">
@@ -5447,7 +5174,7 @@
       </dsp:nvSpPr>
       <dsp:spPr>
         <a:xfrm>
-          <a:off x="9931344" y="3320392"/>
+          <a:off x="9798233" y="3466811"/>
           <a:ext cx="1347145" cy="673572"/>
         </a:xfrm>
         <a:prstGeom prst="roundRect">
@@ -5532,7 +5259,7 @@
                 <a:schemeClr val="tx1"/>
               </a:solidFill>
             </a:rPr>
-            <a:t>N = 19</a:t>
+            <a:t>N = 20</a:t>
           </a:r>
           <a:endParaRPr lang="nl-NL" sz="1800" kern="1200" dirty="0">
             <a:solidFill>
@@ -5542,7 +5269,7 @@
         </a:p>
       </dsp:txBody>
       <dsp:txXfrm>
-        <a:off x="9951072" y="3340120"/>
+        <a:off x="9817961" y="3486539"/>
         <a:ext cx="1307689" cy="634116"/>
       </dsp:txXfrm>
     </dsp:sp>
@@ -5552,9 +5279,9 @@
         <dsp:cNvSpPr/>
       </dsp:nvSpPr>
       <dsp:spPr>
-        <a:xfrm rot="3739364">
-          <a:off x="4438809" y="4107983"/>
-          <a:ext cx="806244" cy="19273"/>
+        <a:xfrm rot="4347473">
+          <a:off x="4220689" y="4324296"/>
+          <a:ext cx="1242483" cy="19273"/>
         </a:xfrm>
         <a:custGeom>
           <a:avLst/>
@@ -5568,7 +5295,7 @@
                 <a:pt x="0" y="9636"/>
               </a:moveTo>
               <a:lnTo>
-                <a:pt x="806244" y="9636"/>
+                <a:pt x="1242483" y="9636"/>
               </a:lnTo>
             </a:path>
           </a:pathLst>
@@ -5617,8 +5344,8 @@
         </a:p>
       </dsp:txBody>
       <dsp:txXfrm>
-        <a:off x="4821775" y="4097464"/>
-        <a:ext cx="40312" cy="40312"/>
+        <a:off x="4810869" y="4302871"/>
+        <a:ext cx="62124" cy="62124"/>
       </dsp:txXfrm>
     </dsp:sp>
     <dsp:sp modelId="{436EDD92-DA6A-4B27-B901-189C516DE422}">
@@ -5628,8 +5355,8 @@
       </dsp:nvSpPr>
       <dsp:spPr>
         <a:xfrm>
-          <a:off x="5029177" y="3911051"/>
-          <a:ext cx="1347145" cy="1127129"/>
+          <a:off x="5029177" y="4432165"/>
+          <a:ext cx="1347145" cy="988238"/>
         </a:xfrm>
         <a:prstGeom prst="roundRect">
           <a:avLst>
@@ -5713,7 +5440,7 @@
                 <a:schemeClr val="tx1"/>
               </a:solidFill>
             </a:rPr>
-            <a:t>N = 43</a:t>
+            <a:t>N = 40</a:t>
           </a:r>
           <a:endParaRPr lang="nl-NL" sz="1800" kern="1200" dirty="0">
             <a:solidFill>
@@ -5723,19 +5450,19 @@
         </a:p>
       </dsp:txBody>
       <dsp:txXfrm>
-        <a:off x="5062189" y="3944063"/>
-        <a:ext cx="1281121" cy="1061105"/>
+        <a:off x="5058122" y="4461110"/>
+        <a:ext cx="1289255" cy="930348"/>
       </dsp:txXfrm>
     </dsp:sp>
-    <dsp:sp modelId="{AE383538-6B8D-480B-B140-11130A077716}">
+    <dsp:sp modelId="{6916750A-C3C3-4973-BA63-D0DC2D57C12A}">
       <dsp:nvSpPr>
         <dsp:cNvPr id="0" name=""/>
         <dsp:cNvSpPr/>
       </dsp:nvSpPr>
       <dsp:spPr>
-        <a:xfrm rot="3400345">
-          <a:off x="6268552" y="4664828"/>
-          <a:ext cx="478369" cy="19273"/>
+        <a:xfrm rot="11841">
+          <a:off x="4654683" y="3732590"/>
+          <a:ext cx="374495" cy="19273"/>
         </a:xfrm>
         <a:custGeom>
           <a:avLst/>
@@ -5749,7 +5476,7 @@
                 <a:pt x="0" y="9636"/>
               </a:moveTo>
               <a:lnTo>
-                <a:pt x="478369" y="9636"/>
+                <a:pt x="374495" y="9636"/>
               </a:lnTo>
             </a:path>
           </a:pathLst>
@@ -5798,19 +5525,19 @@
         </a:p>
       </dsp:txBody>
       <dsp:txXfrm>
-        <a:off x="6495777" y="4662506"/>
-        <a:ext cx="23918" cy="23918"/>
+        <a:off x="4832568" y="3732864"/>
+        <a:ext cx="18724" cy="18724"/>
       </dsp:txXfrm>
     </dsp:sp>
-    <dsp:sp modelId="{F64A791C-00A4-432F-9090-52BCD216B8B8}">
+    <dsp:sp modelId="{A7BD74AC-B185-4330-ACE4-F5A53E4B3F1C}">
       <dsp:nvSpPr>
         <dsp:cNvPr id="0" name=""/>
         <dsp:cNvSpPr/>
       </dsp:nvSpPr>
       <dsp:spPr>
         <a:xfrm>
-          <a:off x="6639150" y="4381666"/>
-          <a:ext cx="1347145" cy="985295"/>
+          <a:off x="5029177" y="3282457"/>
+          <a:ext cx="1347145" cy="920827"/>
         </a:xfrm>
         <a:prstGeom prst="roundRect">
           <a:avLst>
@@ -5904,8 +5631,8 @@
         </a:p>
       </dsp:txBody>
       <dsp:txXfrm>
-        <a:off x="6668008" y="4410524"/>
-        <a:ext cx="1289429" cy="927579"/>
+        <a:off x="5056147" y="3309427"/>
+        <a:ext cx="1293205" cy="866887"/>
       </dsp:txXfrm>
     </dsp:sp>
     <dsp:sp modelId="{47516D7C-106F-4664-A550-6DAB42875566}">
@@ -5914,9 +5641,9 @@
         <dsp:cNvSpPr/>
       </dsp:nvSpPr>
       <dsp:spPr>
-        <a:xfrm rot="17947476">
-          <a:off x="2757838" y="3149418"/>
-          <a:ext cx="731766" cy="19273"/>
+        <a:xfrm rot="17960798">
+          <a:off x="2760363" y="3127482"/>
+          <a:ext cx="726717" cy="19273"/>
         </a:xfrm>
         <a:custGeom>
           <a:avLst/>
@@ -5930,7 +5657,7 @@
                 <a:pt x="0" y="9636"/>
               </a:moveTo>
               <a:lnTo>
-                <a:pt x="731766" y="9636"/>
+                <a:pt x="726717" y="9636"/>
               </a:lnTo>
             </a:path>
           </a:pathLst>
@@ -5979,8 +5706,8 @@
         </a:p>
       </dsp:txBody>
       <dsp:txXfrm>
-        <a:off x="3105427" y="3140760"/>
-        <a:ext cx="36588" cy="36588"/>
+        <a:off x="3105553" y="3118951"/>
+        <a:ext cx="36335" cy="36335"/>
       </dsp:txXfrm>
     </dsp:sp>
     <dsp:sp modelId="{DD6DBAF4-F6AE-4D06-88B8-13D9764C7A2C}">
@@ -5990,7 +5717,7 @@
       </dsp:nvSpPr>
       <dsp:spPr>
         <a:xfrm>
-          <a:off x="3301800" y="2502646"/>
+          <a:off x="3301800" y="2483604"/>
           <a:ext cx="1347145" cy="673572"/>
         </a:xfrm>
         <a:prstGeom prst="roundRect">
@@ -6048,7 +5775,7 @@
             <a:buNone/>
           </a:pPr>
           <a:r>
-            <a:rPr lang="en-US" sz="1800" kern="1200" dirty="0">
+            <a:rPr lang="en-US" sz="1800" kern="1200">
               <a:solidFill>
                 <a:schemeClr val="tx1"/>
               </a:solidFill>
@@ -6070,7 +5797,7 @@
             <a:buNone/>
           </a:pPr>
           <a:r>
-            <a:rPr lang="en-US" sz="1800" kern="1200" dirty="0">
+            <a:rPr lang="en-US" sz="1800" kern="1200">
               <a:solidFill>
                 <a:schemeClr val="tx1"/>
               </a:solidFill>
@@ -6085,7 +5812,7 @@
         </a:p>
       </dsp:txBody>
       <dsp:txXfrm>
-        <a:off x="3321528" y="2522374"/>
+        <a:off x="3321528" y="2503332"/>
         <a:ext cx="1307689" cy="634116"/>
       </dsp:txXfrm>
     </dsp:sp>
@@ -6095,9 +5822,9 @@
         <dsp:cNvSpPr/>
       </dsp:nvSpPr>
       <dsp:spPr>
-        <a:xfrm rot="4477549">
-          <a:off x="2421302" y="4157014"/>
-          <a:ext cx="1427012" cy="19273"/>
+        <a:xfrm rot="4481230">
+          <a:off x="2418512" y="4135078"/>
+          <a:ext cx="1432592" cy="19273"/>
         </a:xfrm>
         <a:custGeom>
           <a:avLst/>
@@ -6111,7 +5838,7 @@
                 <a:pt x="0" y="9636"/>
               </a:moveTo>
               <a:lnTo>
-                <a:pt x="1427012" y="9636"/>
+                <a:pt x="1432592" y="9636"/>
               </a:lnTo>
             </a:path>
           </a:pathLst>
@@ -6160,8 +5887,8 @@
         </a:p>
       </dsp:txBody>
       <dsp:txXfrm>
-        <a:off x="3099133" y="4130975"/>
-        <a:ext cx="71350" cy="71350"/>
+        <a:off x="3098993" y="4108900"/>
+        <a:ext cx="71629" cy="71629"/>
       </dsp:txXfrm>
     </dsp:sp>
     <dsp:sp modelId="{72E97099-95D0-43A9-A70F-C3FFA1BDAD4B}">
@@ -6171,7 +5898,7 @@
       </dsp:nvSpPr>
       <dsp:spPr>
         <a:xfrm>
-          <a:off x="3323974" y="4335747"/>
+          <a:off x="3323974" y="4316704"/>
           <a:ext cx="1347145" cy="1037753"/>
         </a:xfrm>
         <a:prstGeom prst="roundRect">
@@ -6229,7 +5956,7 @@
             <a:buNone/>
           </a:pPr>
           <a:r>
-            <a:rPr lang="en-US" sz="1800" kern="1200" dirty="0">
+            <a:rPr lang="en-US" sz="1800" kern="1200">
               <a:solidFill>
                 <a:schemeClr val="tx1"/>
               </a:solidFill>
@@ -6251,7 +5978,7 @@
             <a:buNone/>
           </a:pPr>
           <a:r>
-            <a:rPr lang="en-US" sz="1800" kern="1200" dirty="0">
+            <a:rPr lang="en-US" sz="1800" kern="1200">
               <a:solidFill>
                 <a:schemeClr val="tx1"/>
               </a:solidFill>
@@ -6273,7 +6000,7 @@
             <a:buNone/>
           </a:pPr>
           <a:r>
-            <a:rPr lang="en-US" sz="1800" kern="1200" dirty="0">
+            <a:rPr lang="en-US" sz="1800" kern="1200">
               <a:solidFill>
                 <a:schemeClr val="tx1"/>
               </a:solidFill>
@@ -6288,7 +6015,7 @@
         </a:p>
       </dsp:txBody>
       <dsp:txXfrm>
-        <a:off x="3354369" y="4366142"/>
+        <a:off x="3354369" y="4347099"/>
         <a:ext cx="1286355" cy="976963"/>
       </dsp:txXfrm>
     </dsp:sp>
@@ -6298,9 +6025,9 @@
         <dsp:cNvSpPr/>
       </dsp:nvSpPr>
       <dsp:spPr>
-        <a:xfrm rot="3838659">
-          <a:off x="1203639" y="4511348"/>
-          <a:ext cx="533488" cy="19273"/>
+        <a:xfrm rot="4507339">
+          <a:off x="1011044" y="4258020"/>
+          <a:ext cx="944840" cy="19273"/>
         </a:xfrm>
         <a:custGeom>
           <a:avLst/>
@@ -6314,7 +6041,7 @@
                 <a:pt x="0" y="9636"/>
               </a:moveTo>
               <a:lnTo>
-                <a:pt x="533488" y="9636"/>
+                <a:pt x="944840" y="9636"/>
               </a:lnTo>
             </a:path>
           </a:pathLst>
@@ -6363,8 +6090,8 @@
         </a:p>
       </dsp:txBody>
       <dsp:txXfrm>
-        <a:off x="1457046" y="4507647"/>
-        <a:ext cx="26674" cy="26674"/>
+        <a:off x="1459843" y="4244036"/>
+        <a:ext cx="47242" cy="47242"/>
       </dsp:txXfrm>
     </dsp:sp>
     <dsp:sp modelId="{08CC485B-8473-4547-A6DE-FFFA16734FA0}">
@@ -6374,7 +6101,7 @@
       </dsp:nvSpPr>
       <dsp:spPr>
         <a:xfrm>
-          <a:off x="1587410" y="4233095"/>
+          <a:off x="1604761" y="4196647"/>
           <a:ext cx="1347145" cy="1055185"/>
         </a:xfrm>
         <a:prstGeom prst="roundRect">
@@ -6432,7 +6159,7 @@
             <a:buNone/>
           </a:pPr>
           <a:r>
-            <a:rPr lang="en-US" sz="1800" kern="1200" dirty="0">
+            <a:rPr lang="en-US" sz="1800" kern="1200">
               <a:solidFill>
                 <a:schemeClr val="tx1"/>
               </a:solidFill>
@@ -6454,7 +6181,7 @@
             <a:buNone/>
           </a:pPr>
           <a:r>
-            <a:rPr lang="en-US" sz="1800" kern="1200" dirty="0">
+            <a:rPr lang="en-US" sz="1800" kern="1200">
               <a:solidFill>
                 <a:schemeClr val="tx1"/>
               </a:solidFill>
@@ -6469,7 +6196,7 @@
         </a:p>
       </dsp:txBody>
       <dsp:txXfrm>
-        <a:off x="1618315" y="4264000"/>
+        <a:off x="1635666" y="4227552"/>
         <a:ext cx="1285335" cy="993375"/>
       </dsp:txXfrm>
     </dsp:sp>
@@ -11882,7 +11609,7 @@
           <a:p>
             <a:fld id="{0D774F42-F867-45E6-92F8-D5C96C5B6EB4}" type="datetimeFigureOut">
               <a:rPr lang="nl-NL" smtClean="0"/>
-              <a:t>22-5-2019</a:t>
+              <a:t>8-9-2019</a:t>
             </a:fld>
             <a:endParaRPr lang="nl-NL"/>
           </a:p>
@@ -12052,7 +11779,7 @@
           <a:p>
             <a:fld id="{0D774F42-F867-45E6-92F8-D5C96C5B6EB4}" type="datetimeFigureOut">
               <a:rPr lang="nl-NL" smtClean="0"/>
-              <a:t>22-5-2019</a:t>
+              <a:t>8-9-2019</a:t>
             </a:fld>
             <a:endParaRPr lang="nl-NL"/>
           </a:p>
@@ -12232,7 +11959,7 @@
           <a:p>
             <a:fld id="{0D774F42-F867-45E6-92F8-D5C96C5B6EB4}" type="datetimeFigureOut">
               <a:rPr lang="nl-NL" smtClean="0"/>
-              <a:t>22-5-2019</a:t>
+              <a:t>8-9-2019</a:t>
             </a:fld>
             <a:endParaRPr lang="nl-NL"/>
           </a:p>
@@ -12402,7 +12129,7 @@
           <a:p>
             <a:fld id="{0D774F42-F867-45E6-92F8-D5C96C5B6EB4}" type="datetimeFigureOut">
               <a:rPr lang="nl-NL" smtClean="0"/>
-              <a:t>22-5-2019</a:t>
+              <a:t>8-9-2019</a:t>
             </a:fld>
             <a:endParaRPr lang="nl-NL"/>
           </a:p>
@@ -12648,7 +12375,7 @@
           <a:p>
             <a:fld id="{0D774F42-F867-45E6-92F8-D5C96C5B6EB4}" type="datetimeFigureOut">
               <a:rPr lang="nl-NL" smtClean="0"/>
-              <a:t>22-5-2019</a:t>
+              <a:t>8-9-2019</a:t>
             </a:fld>
             <a:endParaRPr lang="nl-NL"/>
           </a:p>
@@ -12880,7 +12607,7 @@
           <a:p>
             <a:fld id="{0D774F42-F867-45E6-92F8-D5C96C5B6EB4}" type="datetimeFigureOut">
               <a:rPr lang="nl-NL" smtClean="0"/>
-              <a:t>22-5-2019</a:t>
+              <a:t>8-9-2019</a:t>
             </a:fld>
             <a:endParaRPr lang="nl-NL"/>
           </a:p>
@@ -13247,7 +12974,7 @@
           <a:p>
             <a:fld id="{0D774F42-F867-45E6-92F8-D5C96C5B6EB4}" type="datetimeFigureOut">
               <a:rPr lang="nl-NL" smtClean="0"/>
-              <a:t>22-5-2019</a:t>
+              <a:t>8-9-2019</a:t>
             </a:fld>
             <a:endParaRPr lang="nl-NL"/>
           </a:p>
@@ -13365,7 +13092,7 @@
           <a:p>
             <a:fld id="{0D774F42-F867-45E6-92F8-D5C96C5B6EB4}" type="datetimeFigureOut">
               <a:rPr lang="nl-NL" smtClean="0"/>
-              <a:t>22-5-2019</a:t>
+              <a:t>8-9-2019</a:t>
             </a:fld>
             <a:endParaRPr lang="nl-NL"/>
           </a:p>
@@ -13460,7 +13187,7 @@
           <a:p>
             <a:fld id="{0D774F42-F867-45E6-92F8-D5C96C5B6EB4}" type="datetimeFigureOut">
               <a:rPr lang="nl-NL" smtClean="0"/>
-              <a:t>22-5-2019</a:t>
+              <a:t>8-9-2019</a:t>
             </a:fld>
             <a:endParaRPr lang="nl-NL"/>
           </a:p>
@@ -13737,7 +13464,7 @@
           <a:p>
             <a:fld id="{0D774F42-F867-45E6-92F8-D5C96C5B6EB4}" type="datetimeFigureOut">
               <a:rPr lang="nl-NL" smtClean="0"/>
-              <a:t>22-5-2019</a:t>
+              <a:t>8-9-2019</a:t>
             </a:fld>
             <a:endParaRPr lang="nl-NL"/>
           </a:p>
@@ -13994,7 +13721,7 @@
           <a:p>
             <a:fld id="{0D774F42-F867-45E6-92F8-D5C96C5B6EB4}" type="datetimeFigureOut">
               <a:rPr lang="nl-NL" smtClean="0"/>
-              <a:t>22-5-2019</a:t>
+              <a:t>8-9-2019</a:t>
             </a:fld>
             <a:endParaRPr lang="nl-NL"/>
           </a:p>
@@ -14207,7 +13934,7 @@
           <a:p>
             <a:fld id="{0D774F42-F867-45E6-92F8-D5C96C5B6EB4}" type="datetimeFigureOut">
               <a:rPr lang="nl-NL" smtClean="0"/>
-              <a:t>22-5-2019</a:t>
+              <a:t>8-9-2019</a:t>
             </a:fld>
             <a:endParaRPr lang="nl-NL"/>
           </a:p>
@@ -14628,7 +14355,7 @@
             <p:ph idx="1"/>
             <p:extLst>
               <p:ext uri="{D42A27DB-BD31-4B8C-83A1-F6EECF244321}">
-                <p14:modId xmlns:p14="http://schemas.microsoft.com/office/powerpoint/2010/main" val="563169808"/>
+                <p14:modId xmlns:p14="http://schemas.microsoft.com/office/powerpoint/2010/main" val="1384963892"/>
               </p:ext>
             </p:extLst>
           </p:nvPr>
@@ -14659,8 +14386,8 @@
         </p:nvCxnSpPr>
         <p:spPr>
           <a:xfrm flipV="1">
-            <a:off x="6714331" y="4012276"/>
-            <a:ext cx="268360" cy="809106"/>
+            <a:off x="6714331" y="4311570"/>
+            <a:ext cx="265203" cy="804440"/>
           </a:xfrm>
           <a:prstGeom prst="line">
             <a:avLst/>

</xml_diff>